<commit_message>
update guided capstone project
</commit_message>
<xml_diff>
--- a/Guided Capstone Project.pptx
+++ b/Guided Capstone Project.pptx
@@ -5,20 +5,21 @@
     <p:sldMasterId id="2147483648" r:id="rId1"/>
   </p:sldMasterIdLst>
   <p:notesMasterIdLst>
-    <p:notesMasterId r:id="rId13"/>
+    <p:notesMasterId r:id="rId14"/>
   </p:notesMasterIdLst>
   <p:sldIdLst>
     <p:sldId id="259" r:id="rId2"/>
     <p:sldId id="260" r:id="rId3"/>
     <p:sldId id="258" r:id="rId4"/>
-    <p:sldId id="261" r:id="rId5"/>
-    <p:sldId id="262" r:id="rId6"/>
-    <p:sldId id="264" r:id="rId7"/>
-    <p:sldId id="267" r:id="rId8"/>
-    <p:sldId id="266" r:id="rId9"/>
-    <p:sldId id="268" r:id="rId10"/>
-    <p:sldId id="265" r:id="rId11"/>
-    <p:sldId id="263" r:id="rId12"/>
+    <p:sldId id="270" r:id="rId5"/>
+    <p:sldId id="261" r:id="rId6"/>
+    <p:sldId id="262" r:id="rId7"/>
+    <p:sldId id="264" r:id="rId8"/>
+    <p:sldId id="267" r:id="rId9"/>
+    <p:sldId id="271" r:id="rId10"/>
+    <p:sldId id="268" r:id="rId11"/>
+    <p:sldId id="265" r:id="rId12"/>
+    <p:sldId id="263" r:id="rId13"/>
   </p:sldIdLst>
   <p:sldSz cx="9906000" cy="6858000" type="A4"/>
   <p:notesSz cx="7102475" cy="9388475"/>
@@ -267,7 +268,7 @@
       </p15:sldGuideLst>
     </p:ext>
     <p:ext uri="http://customooxmlschemas.google.com/">
-      <go:slidesCustomData xmlns:go="http://customooxmlschemas.google.com/" xmlns:p15="http://schemas.microsoft.com/office/powerpoint/2012/main" xmlns:p14="http://schemas.microsoft.com/office/powerpoint/2010/main" xmlns:com="http://schemas.openxmlformats.org/drawingml/2006/compatibility" xmlns:pvml="urn:schemas-microsoft-com:office:powerpoint" xmlns:v="urn:schemas-microsoft-com:vml" xmlns:o="urn:schemas-microsoft-com:office:office" xmlns:dgm="http://schemas.openxmlformats.org/drawingml/2006/diagram" xmlns:c="http://schemas.openxmlformats.org/drawingml/2006/chart" xmlns:mv="urn:schemas-microsoft-com:mac:vml" xmlns:mc="http://schemas.openxmlformats.org/markup-compatibility/2006" xmlns="" r:id="rId14" roundtripDataSignature="AMtx7mjdo7FECp685JsX7/4pIVeoAktjNA=="/>
+      <go:slidesCustomData xmlns:go="http://customooxmlschemas.google.com/" xmlns:p15="http://schemas.microsoft.com/office/powerpoint/2012/main" xmlns:p14="http://schemas.microsoft.com/office/powerpoint/2010/main" xmlns:com="http://schemas.openxmlformats.org/drawingml/2006/compatibility" xmlns:pvml="urn:schemas-microsoft-com:office:powerpoint" xmlns:v="urn:schemas-microsoft-com:vml" xmlns:o="urn:schemas-microsoft-com:office:office" xmlns:dgm="http://schemas.openxmlformats.org/drawingml/2006/diagram" xmlns:c="http://schemas.openxmlformats.org/drawingml/2006/chart" xmlns:mv="urn:schemas-microsoft-com:mac:vml" xmlns:mc="http://schemas.openxmlformats.org/markup-compatibility/2006" xmlns="" r:id="rId15" roundtripDataSignature="AMtx7mjdo7FECp685JsX7/4pIVeoAktjNA=="/>
     </p:ext>
   </p:extLst>
 </p:presentation>
@@ -2053,6 +2054,102 @@
 </p:notes>
 </file>
 
+<file path=ppt/notesSlides/notesSlide12.xml><?xml version="1.0" encoding="utf-8"?>
+<p:notes xmlns:a="http://schemas.openxmlformats.org/drawingml/2006/main" xmlns:r="http://schemas.openxmlformats.org/officeDocument/2006/relationships" xmlns:p="http://schemas.openxmlformats.org/presentationml/2006/main" showMasterSp="0" showMasterPhAnim="0">
+  <p:cSld>
+    <p:spTree>
+      <p:nvGrpSpPr>
+        <p:cNvPr id="1" name="Shape 190"/>
+        <p:cNvGrpSpPr/>
+        <p:nvPr/>
+      </p:nvGrpSpPr>
+      <p:grpSpPr>
+        <a:xfrm>
+          <a:off x="0" y="0"/>
+          <a:ext cx="0" cy="0"/>
+          <a:chOff x="0" y="0"/>
+          <a:chExt cx="0" cy="0"/>
+        </a:xfrm>
+      </p:grpSpPr>
+      <p:sp>
+        <p:nvSpPr>
+          <p:cNvPr id="191" name="Google Shape;191;g9ac841090f_0_17:notes"/>
+          <p:cNvSpPr txBox="1">
+            <a:spLocks noGrp="1"/>
+          </p:cNvSpPr>
+          <p:nvPr>
+            <p:ph type="body" idx="1"/>
+          </p:nvPr>
+        </p:nvSpPr>
+        <p:spPr>
+          <a:xfrm>
+            <a:off x="710248" y="4459526"/>
+            <a:ext cx="5681980" cy="4224814"/>
+          </a:xfrm>
+          <a:prstGeom prst="rect">
+            <a:avLst/>
+          </a:prstGeom>
+        </p:spPr>
+        <p:txBody>
+          <a:bodyPr spcFirstLastPara="1" wrap="square" lIns="94213" tIns="94213" rIns="94213" bIns="94213" anchor="t" anchorCtr="0">
+            <a:noAutofit/>
+          </a:bodyPr>
+          <a:lstStyle/>
+          <a:p>
+            <a:pPr marL="0" indent="0"/>
+            <a:endParaRPr/>
+          </a:p>
+        </p:txBody>
+      </p:sp>
+      <p:sp>
+        <p:nvSpPr>
+          <p:cNvPr id="192" name="Google Shape;192;g9ac841090f_0_17:notes"/>
+          <p:cNvSpPr>
+            <a:spLocks noGrp="1" noRot="1" noChangeAspect="1"/>
+          </p:cNvSpPr>
+          <p:nvPr>
+            <p:ph type="sldImg" idx="2"/>
+          </p:nvPr>
+        </p:nvSpPr>
+        <p:spPr>
+          <a:xfrm>
+            <a:off x="1009650" y="704850"/>
+            <a:ext cx="5083175" cy="3519488"/>
+          </a:xfrm>
+          <a:custGeom>
+            <a:avLst/>
+            <a:gdLst/>
+            <a:ahLst/>
+            <a:cxnLst/>
+            <a:rect l="l" t="t" r="r" b="b"/>
+            <a:pathLst>
+              <a:path w="120000" h="120000" extrusionOk="0">
+                <a:moveTo>
+                  <a:pt x="0" y="0"/>
+                </a:moveTo>
+                <a:lnTo>
+                  <a:pt x="120000" y="0"/>
+                </a:lnTo>
+                <a:lnTo>
+                  <a:pt x="120000" y="120000"/>
+                </a:lnTo>
+                <a:lnTo>
+                  <a:pt x="0" y="120000"/>
+                </a:lnTo>
+                <a:close/>
+              </a:path>
+            </a:pathLst>
+          </a:custGeom>
+        </p:spPr>
+      </p:sp>
+    </p:spTree>
+  </p:cSld>
+  <p:clrMapOvr>
+    <a:masterClrMapping/>
+  </p:clrMapOvr>
+</p:notes>
+</file>
+
 <file path=ppt/notesSlides/notesSlide2.xml><?xml version="1.0" encoding="utf-8"?>
 <p:notes xmlns:a="http://schemas.openxmlformats.org/drawingml/2006/main" xmlns:r="http://schemas.openxmlformats.org/officeDocument/2006/relationships" xmlns:p="http://schemas.openxmlformats.org/presentationml/2006/main" showMasterSp="0" showMasterPhAnim="0">
   <p:cSld>
@@ -2397,7 +2494,7 @@
   <p:cSld>
     <p:spTree>
       <p:nvGrpSpPr>
-        <p:cNvPr id="1" name="Shape 190"/>
+        <p:cNvPr id="1" name="Shape 180"/>
         <p:cNvGrpSpPr/>
         <p:nvPr/>
       </p:nvGrpSpPr>
@@ -2411,7 +2508,7 @@
       </p:grpSpPr>
       <p:sp>
         <p:nvSpPr>
-          <p:cNvPr id="191" name="Google Shape;191;g9ac841090f_0_17:notes"/>
+          <p:cNvPr id="181" name="Google Shape;181;g4fd2ad1623_0_49:notes"/>
           <p:cNvSpPr txBox="1">
             <a:spLocks noGrp="1"/>
           </p:cNvSpPr>
@@ -2441,7 +2538,7 @@
       </p:sp>
       <p:sp>
         <p:nvSpPr>
-          <p:cNvPr id="192" name="Google Shape;192;g9ac841090f_0_17:notes"/>
+          <p:cNvPr id="182" name="Google Shape;182;g4fd2ad1623_0_49:notes"/>
           <p:cNvSpPr>
             <a:spLocks noGrp="1" noRot="1" noChangeAspect="1"/>
           </p:cNvSpPr>
@@ -6276,6 +6373,34 @@
           </a:p>
         </p:txBody>
       </p:sp>
+      <p:sp>
+        <p:nvSpPr>
+          <p:cNvPr id="2" name="Rectangle 1"/>
+          <p:cNvSpPr/>
+          <p:nvPr/>
+        </p:nvSpPr>
+        <p:spPr>
+          <a:xfrm>
+            <a:off x="6316556" y="6629504"/>
+            <a:ext cx="3589444" cy="246221"/>
+          </a:xfrm>
+          <a:prstGeom prst="rect">
+            <a:avLst/>
+          </a:prstGeom>
+        </p:spPr>
+        <p:txBody>
+          <a:bodyPr wrap="none">
+            <a:spAutoFit/>
+          </a:bodyPr>
+          <a:lstStyle/>
+          <a:p>
+            <a:r>
+              <a:rPr lang="en-US" sz="1000" dirty="0"/>
+              <a:t>https://github.com/BinhKieu82/DataScienceGuidedCapstone</a:t>
+            </a:r>
+          </a:p>
+        </p:txBody>
+      </p:sp>
     </p:spTree>
     <p:extLst>
       <p:ext uri="{BB962C8B-B14F-4D97-AF65-F5344CB8AC3E}">
@@ -6341,8 +6466,8 @@
         </p:nvSpPr>
         <p:spPr>
           <a:xfrm>
-            <a:off x="0" y="862036"/>
-            <a:ext cx="9906000" cy="3880880"/>
+            <a:off x="0" y="785123"/>
+            <a:ext cx="9906000" cy="573658"/>
           </a:xfrm>
           <a:prstGeom prst="rect">
             <a:avLst/>
@@ -6358,368 +6483,99 @@
           </a:bodyPr>
           <a:lstStyle/>
           <a:p>
-            <a:pPr marL="285750" indent="-285750">
-              <a:buFont typeface="Arial" panose="020B0604020202020204" pitchFamily="34" charset="0"/>
-              <a:buChar char="•"/>
-            </a:pPr>
-            <a:r>
-              <a:rPr lang="en-US" sz="1600" dirty="0" smtClean="0"/>
-              <a:t>BMR </a:t>
-            </a:r>
-            <a:r>
-              <a:rPr lang="en-US" sz="1600" dirty="0"/>
-              <a:t>price has been predicted is $95.87 using Random Forest model excluding BMR info vs $81 actual one. It means that it still has room to increase ticket price then revenue</a:t>
-            </a:r>
-            <a:r>
-              <a:rPr lang="en-US" sz="1600" dirty="0" smtClean="0"/>
-              <a:t>.</a:t>
-            </a:r>
-          </a:p>
-          <a:p>
-            <a:pPr marL="285750" indent="-285750">
-              <a:buFont typeface="Arial" panose="020B0604020202020204" pitchFamily="34" charset="0"/>
-              <a:buChar char="•"/>
-            </a:pPr>
-            <a:endParaRPr lang="en-US" sz="1600" dirty="0"/>
-          </a:p>
-          <a:p>
-            <a:pPr marL="285750" indent="-285750">
-              <a:buFont typeface="Arial" panose="020B0604020202020204" pitchFamily="34" charset="0"/>
-              <a:buChar char="•"/>
-            </a:pPr>
-            <a:r>
-              <a:rPr lang="en-US" sz="1600" dirty="0"/>
-              <a:t>04 </a:t>
-            </a:r>
-            <a:r>
-              <a:rPr lang="en-US" sz="1600" dirty="0" err="1"/>
-              <a:t>scienarios</a:t>
-            </a:r>
-            <a:r>
-              <a:rPr lang="en-US" sz="1600" dirty="0"/>
-              <a:t> have been run to reveal the variation of ticket price when key features/facilities change. The results showing that number of Runs, </a:t>
-            </a:r>
-            <a:r>
-              <a:rPr lang="en-US" sz="1600" dirty="0" err="1"/>
+            <a:pPr lvl="0"/>
+            <a:r>
+              <a:rPr lang="en-US" sz="1600" dirty="0" smtClean="0">
+                <a:solidFill>
+                  <a:schemeClr val="dk1"/>
+                </a:solidFill>
+                <a:latin typeface="Calibri"/>
+                <a:ea typeface="Calibri"/>
+                <a:cs typeface="Calibri"/>
+              </a:rPr>
+              <a:t>- 04 modeling scenarios have been suggested basing on strategy of using these features: </a:t>
+            </a:r>
+            <a:r>
+              <a:rPr lang="en-US" sz="1600" b="1" dirty="0" err="1" smtClean="0">
+                <a:solidFill>
+                  <a:schemeClr val="dk1"/>
+                </a:solidFill>
+                <a:latin typeface="Calibri"/>
+                <a:ea typeface="Calibri"/>
+                <a:cs typeface="Calibri"/>
+              </a:rPr>
               <a:t>vertical_drop</a:t>
             </a:r>
             <a:r>
-              <a:rPr lang="en-US" sz="1600" dirty="0"/>
-              <a:t> &amp; </a:t>
-            </a:r>
-            <a:r>
-              <a:rPr lang="en-US" sz="1600" dirty="0" err="1"/>
+              <a:rPr lang="en-US" sz="1600" b="1" dirty="0">
+                <a:solidFill>
+                  <a:schemeClr val="dk1"/>
+                </a:solidFill>
+                <a:latin typeface="Calibri"/>
+                <a:ea typeface="Calibri"/>
+                <a:cs typeface="Calibri"/>
+              </a:rPr>
+              <a:t>, Snow </a:t>
+            </a:r>
+            <a:r>
+              <a:rPr lang="en-US" sz="1600" b="1" dirty="0" err="1">
+                <a:solidFill>
+                  <a:schemeClr val="dk1"/>
+                </a:solidFill>
+                <a:latin typeface="Calibri"/>
+                <a:ea typeface="Calibri"/>
+                <a:cs typeface="Calibri"/>
+              </a:rPr>
+              <a:t>Making_ac</a:t>
+            </a:r>
+            <a:r>
+              <a:rPr lang="en-US" sz="1600" b="1" dirty="0">
+                <a:solidFill>
+                  <a:schemeClr val="dk1"/>
+                </a:solidFill>
+                <a:latin typeface="Calibri"/>
+                <a:ea typeface="Calibri"/>
+                <a:cs typeface="Calibri"/>
+              </a:rPr>
+              <a:t>, </a:t>
+            </a:r>
+            <a:r>
+              <a:rPr lang="en-US" sz="1600" b="1" dirty="0" err="1">
+                <a:solidFill>
+                  <a:schemeClr val="dk1"/>
+                </a:solidFill>
+                <a:latin typeface="Calibri"/>
+                <a:ea typeface="Calibri"/>
+                <a:cs typeface="Calibri"/>
+              </a:rPr>
               <a:t>total_chairs</a:t>
             </a:r>
             <a:r>
-              <a:rPr lang="en-US" sz="1600" dirty="0"/>
-              <a:t> are the most effected features to the ticket price &amp; revenue. The suggested price increase is $1.9 leading an increasing of $3474638 in revenue over a season</a:t>
-            </a:r>
-            <a:r>
-              <a:rPr lang="en-US" sz="1600" dirty="0" smtClean="0"/>
-              <a:t>.</a:t>
-            </a:r>
-          </a:p>
-          <a:p>
-            <a:pPr marL="285750" indent="-285750">
-              <a:buFont typeface="Arial" panose="020B0604020202020204" pitchFamily="34" charset="0"/>
-              <a:buChar char="•"/>
-            </a:pPr>
-            <a:endParaRPr lang="en-US" sz="1600" dirty="0"/>
-          </a:p>
-          <a:p>
-            <a:pPr marL="285750" indent="-285750">
-              <a:buFont typeface="Arial" panose="020B0604020202020204" pitchFamily="34" charset="0"/>
-              <a:buChar char="•"/>
-            </a:pPr>
-            <a:r>
-              <a:rPr lang="en-US" sz="1600" dirty="0"/>
-              <a:t>Continue running the model by increasing number of Runs, an interesting number of revenue increase is $5123188 meanwhile ticket price is only higher $2.93. By playing around with many other cases might reach an optimum </a:t>
-            </a:r>
-            <a:r>
-              <a:rPr lang="en-US" sz="1600" dirty="0" smtClean="0"/>
-              <a:t>solution.</a:t>
-            </a:r>
-            <a:endParaRPr lang="en-US" sz="1600" dirty="0"/>
-          </a:p>
-          <a:p>
-            <a:pPr marL="457200" lvl="0" indent="-330200" algn="l" rtl="0">
-              <a:spcBef>
-                <a:spcPts val="0"/>
-              </a:spcBef>
-              <a:spcAft>
-                <a:spcPts val="0"/>
-              </a:spcAft>
-              <a:buClr>
-                <a:schemeClr val="dk1"/>
-              </a:buClr>
-              <a:buSzPts val="1600"/>
-              <a:buFont typeface="Calibri"/>
-              <a:buAutoNum type="arabicPeriod" startAt="4"/>
-            </a:pPr>
-            <a:endParaRPr sz="1600" dirty="0">
+              <a:rPr lang="en-US" sz="1600" b="1" dirty="0" smtClean="0">
+                <a:solidFill>
+                  <a:schemeClr val="dk1"/>
+                </a:solidFill>
+                <a:latin typeface="Calibri"/>
+                <a:ea typeface="Calibri"/>
+                <a:cs typeface="Calibri"/>
+              </a:rPr>
+              <a:t>, Runs, </a:t>
+            </a:r>
+            <a:r>
+              <a:rPr lang="en-US" sz="1600" b="1" dirty="0" err="1" smtClean="0">
+                <a:solidFill>
+                  <a:schemeClr val="dk1"/>
+                </a:solidFill>
+                <a:latin typeface="Calibri"/>
+                <a:ea typeface="Calibri"/>
+                <a:cs typeface="Calibri"/>
+              </a:rPr>
+              <a:t>LongestRun_mi</a:t>
+            </a:r>
+            <a:endParaRPr sz="1600" b="1" dirty="0">
               <a:solidFill>
                 <a:schemeClr val="dk1"/>
               </a:solidFill>
-              <a:latin typeface="Calibri"/>
-              <a:ea typeface="Calibri"/>
-              <a:cs typeface="Calibri"/>
-              <a:sym typeface="Calibri"/>
-            </a:endParaRPr>
-          </a:p>
-          <a:p>
-            <a:pPr marL="457200" lvl="0" indent="0" algn="l" rtl="0">
-              <a:spcBef>
-                <a:spcPts val="0"/>
-              </a:spcBef>
-              <a:spcAft>
-                <a:spcPts val="0"/>
-              </a:spcAft>
-              <a:buNone/>
-            </a:pPr>
-            <a:endParaRPr sz="1600" dirty="0">
-              <a:solidFill>
-                <a:schemeClr val="dk1"/>
-              </a:solidFill>
-              <a:latin typeface="Calibri"/>
-              <a:ea typeface="Calibri"/>
-              <a:cs typeface="Calibri"/>
-              <a:sym typeface="Calibri"/>
-            </a:endParaRPr>
-          </a:p>
-          <a:p>
-            <a:pPr marL="457200" lvl="0" indent="0" algn="l" rtl="0">
-              <a:spcBef>
-                <a:spcPts val="0"/>
-              </a:spcBef>
-              <a:spcAft>
-                <a:spcPts val="0"/>
-              </a:spcAft>
-              <a:buNone/>
-            </a:pPr>
-            <a:endParaRPr sz="1600" dirty="0">
-              <a:solidFill>
-                <a:schemeClr val="dk1"/>
-              </a:solidFill>
-              <a:latin typeface="Calibri"/>
-              <a:ea typeface="Calibri"/>
-              <a:cs typeface="Calibri"/>
-              <a:sym typeface="Calibri"/>
-            </a:endParaRPr>
-          </a:p>
-          <a:p>
-            <a:pPr marL="457200" lvl="0" indent="0" algn="l" rtl="0">
-              <a:spcBef>
-                <a:spcPts val="0"/>
-              </a:spcBef>
-              <a:spcAft>
-                <a:spcPts val="0"/>
-              </a:spcAft>
-              <a:buNone/>
-            </a:pPr>
-            <a:endParaRPr sz="1600" dirty="0">
-              <a:solidFill>
-                <a:schemeClr val="dk1"/>
-              </a:solidFill>
-              <a:latin typeface="Calibri"/>
-              <a:ea typeface="Calibri"/>
-              <a:cs typeface="Calibri"/>
-              <a:sym typeface="Calibri"/>
-            </a:endParaRPr>
-          </a:p>
-          <a:p>
-            <a:pPr marL="457200" lvl="0" indent="0" algn="l" rtl="0">
-              <a:spcBef>
-                <a:spcPts val="0"/>
-              </a:spcBef>
-              <a:spcAft>
-                <a:spcPts val="0"/>
-              </a:spcAft>
-              <a:buNone/>
-            </a:pPr>
-            <a:endParaRPr sz="1600" dirty="0">
-              <a:solidFill>
-                <a:schemeClr val="dk1"/>
-              </a:solidFill>
-              <a:latin typeface="Calibri"/>
-              <a:ea typeface="Calibri"/>
-              <a:cs typeface="Calibri"/>
-              <a:sym typeface="Calibri"/>
-            </a:endParaRPr>
-          </a:p>
-          <a:p>
-            <a:pPr marL="457200" lvl="0" indent="0" algn="l" rtl="0">
-              <a:spcBef>
-                <a:spcPts val="0"/>
-              </a:spcBef>
-              <a:spcAft>
-                <a:spcPts val="0"/>
-              </a:spcAft>
-              <a:buNone/>
-            </a:pPr>
-            <a:endParaRPr sz="1600" dirty="0">
-              <a:solidFill>
-                <a:schemeClr val="dk1"/>
-              </a:solidFill>
-              <a:latin typeface="Calibri"/>
-              <a:ea typeface="Calibri"/>
-              <a:cs typeface="Calibri"/>
-              <a:sym typeface="Calibri"/>
-            </a:endParaRPr>
-          </a:p>
-          <a:p>
-            <a:pPr marL="457200" lvl="0" indent="0" algn="l" rtl="0">
-              <a:spcBef>
-                <a:spcPts val="0"/>
-              </a:spcBef>
-              <a:spcAft>
-                <a:spcPts val="0"/>
-              </a:spcAft>
-              <a:buNone/>
-            </a:pPr>
-            <a:endParaRPr sz="1600" dirty="0">
-              <a:solidFill>
-                <a:schemeClr val="dk1"/>
-              </a:solidFill>
-              <a:latin typeface="Calibri"/>
-              <a:ea typeface="Calibri"/>
-              <a:cs typeface="Calibri"/>
-              <a:sym typeface="Calibri"/>
-            </a:endParaRPr>
-          </a:p>
-          <a:p>
-            <a:pPr marL="457200" lvl="0" indent="0" algn="l" rtl="0">
-              <a:spcBef>
-                <a:spcPts val="0"/>
-              </a:spcBef>
-              <a:spcAft>
-                <a:spcPts val="0"/>
-              </a:spcAft>
-              <a:buNone/>
-            </a:pPr>
-            <a:endParaRPr sz="1600" dirty="0">
-              <a:solidFill>
-                <a:schemeClr val="dk1"/>
-              </a:solidFill>
-              <a:latin typeface="Calibri"/>
-              <a:ea typeface="Calibri"/>
-              <a:cs typeface="Calibri"/>
-              <a:sym typeface="Calibri"/>
-            </a:endParaRPr>
-          </a:p>
-          <a:p>
-            <a:pPr marL="457200" lvl="0" indent="0" algn="l" rtl="0">
-              <a:spcBef>
-                <a:spcPts val="0"/>
-              </a:spcBef>
-              <a:spcAft>
-                <a:spcPts val="0"/>
-              </a:spcAft>
-              <a:buNone/>
-            </a:pPr>
-            <a:endParaRPr sz="1600" dirty="0">
-              <a:solidFill>
-                <a:schemeClr val="dk1"/>
-              </a:solidFill>
-              <a:latin typeface="Calibri"/>
-              <a:ea typeface="Calibri"/>
-              <a:cs typeface="Calibri"/>
-              <a:sym typeface="Calibri"/>
-            </a:endParaRPr>
-          </a:p>
-          <a:p>
-            <a:pPr marL="457200" lvl="0" indent="0" algn="l" rtl="0">
-              <a:spcBef>
-                <a:spcPts val="0"/>
-              </a:spcBef>
-              <a:spcAft>
-                <a:spcPts val="0"/>
-              </a:spcAft>
-              <a:buNone/>
-            </a:pPr>
-            <a:endParaRPr sz="1600" dirty="0">
-              <a:solidFill>
-                <a:schemeClr val="dk1"/>
-              </a:solidFill>
-              <a:latin typeface="Calibri"/>
-              <a:ea typeface="Calibri"/>
-              <a:cs typeface="Calibri"/>
-              <a:sym typeface="Calibri"/>
-            </a:endParaRPr>
-          </a:p>
-          <a:p>
-            <a:pPr marL="457200" lvl="0" indent="0" algn="l" rtl="0">
-              <a:spcBef>
-                <a:spcPts val="0"/>
-              </a:spcBef>
-              <a:spcAft>
-                <a:spcPts val="0"/>
-              </a:spcAft>
-              <a:buNone/>
-            </a:pPr>
-            <a:endParaRPr sz="1600" dirty="0">
-              <a:solidFill>
-                <a:schemeClr val="dk1"/>
-              </a:solidFill>
-              <a:latin typeface="Calibri"/>
-              <a:ea typeface="Calibri"/>
-              <a:cs typeface="Calibri"/>
-              <a:sym typeface="Calibri"/>
-            </a:endParaRPr>
-          </a:p>
-          <a:p>
-            <a:pPr marL="457200" lvl="0" indent="0" algn="l" rtl="0">
-              <a:spcBef>
-                <a:spcPts val="0"/>
-              </a:spcBef>
-              <a:spcAft>
-                <a:spcPts val="0"/>
-              </a:spcAft>
-              <a:buClr>
-                <a:schemeClr val="dk1"/>
-              </a:buClr>
-              <a:buSzPts val="1100"/>
-              <a:buFont typeface="Arial"/>
-              <a:buNone/>
-            </a:pPr>
-            <a:endParaRPr sz="1600" dirty="0">
-              <a:solidFill>
-                <a:schemeClr val="dk1"/>
-              </a:solidFill>
-              <a:latin typeface="Calibri"/>
-              <a:ea typeface="Calibri"/>
-              <a:cs typeface="Calibri"/>
-              <a:sym typeface="Calibri"/>
-            </a:endParaRPr>
-          </a:p>
-          <a:p>
-            <a:pPr marL="0" lvl="0" indent="0" algn="l" rtl="0">
-              <a:spcBef>
-                <a:spcPts val="0"/>
-              </a:spcBef>
-              <a:spcAft>
-                <a:spcPts val="0"/>
-              </a:spcAft>
-              <a:buNone/>
-            </a:pPr>
-            <a:endParaRPr sz="1600" b="1" dirty="0">
-              <a:latin typeface="Calibri"/>
-              <a:ea typeface="Calibri"/>
-              <a:cs typeface="Calibri"/>
-              <a:sym typeface="Calibri"/>
-            </a:endParaRPr>
-          </a:p>
-          <a:p>
-            <a:pPr marL="457200" lvl="0" indent="0" algn="l" rtl="0">
-              <a:spcBef>
-                <a:spcPts val="0"/>
-              </a:spcBef>
-              <a:spcAft>
-                <a:spcPts val="0"/>
-              </a:spcAft>
-              <a:buNone/>
-            </a:pPr>
-            <a:endParaRPr sz="1600" dirty="0">
               <a:latin typeface="Calibri"/>
               <a:ea typeface="Calibri"/>
               <a:cs typeface="Calibri"/>
@@ -6854,7 +6710,7 @@
                 <a:cs typeface="Calibri"/>
                 <a:sym typeface="Roboto"/>
               </a:rPr>
-              <a:t>Modeling Results &amp; Analysis</a:t>
+              <a:t>RF Model Deployment in Market Context</a:t>
             </a:r>
             <a:endParaRPr sz="2000" dirty="0">
               <a:solidFill>
@@ -6871,10 +6727,692 @@
           </a:p>
         </p:txBody>
       </p:sp>
+      <p:pic>
+        <p:nvPicPr>
+          <p:cNvPr id="12" name="Picture 2"/>
+          <p:cNvPicPr>
+            <a:picLocks noChangeAspect="1" noChangeArrowheads="1"/>
+          </p:cNvPicPr>
+          <p:nvPr/>
+        </p:nvPicPr>
+        <p:blipFill>
+          <a:blip r:embed="rId4">
+            <a:extLst>
+              <a:ext uri="{28A0092B-C50C-407E-A947-70E740481C1C}">
+                <a14:useLocalDpi xmlns:a14="http://schemas.microsoft.com/office/drawing/2010/main" val="0"/>
+              </a:ext>
+            </a:extLst>
+          </a:blip>
+          <a:srcRect/>
+          <a:stretch>
+            <a:fillRect/>
+          </a:stretch>
+        </p:blipFill>
+        <p:spPr bwMode="auto">
+          <a:xfrm>
+            <a:off x="0" y="1906192"/>
+            <a:ext cx="3240000" cy="1703721"/>
+          </a:xfrm>
+          <a:prstGeom prst="rect">
+            <a:avLst/>
+          </a:prstGeom>
+          <a:noFill/>
+          <a:ln>
+            <a:noFill/>
+          </a:ln>
+          <a:extLst>
+            <a:ext uri="{909E8E84-426E-40DD-AFC4-6F175D3DCCD1}">
+              <a14:hiddenFill xmlns:a14="http://schemas.microsoft.com/office/drawing/2010/main">
+                <a:solidFill>
+                  <a:schemeClr val="accent1"/>
+                </a:solidFill>
+              </a14:hiddenFill>
+            </a:ext>
+            <a:ext uri="{91240B29-F687-4F45-9708-019B960494DF}">
+              <a14:hiddenLine xmlns:a14="http://schemas.microsoft.com/office/drawing/2010/main" w="9525">
+                <a:solidFill>
+                  <a:schemeClr val="tx1"/>
+                </a:solidFill>
+                <a:miter lim="800000"/>
+                <a:headEnd/>
+                <a:tailEnd/>
+              </a14:hiddenLine>
+            </a:ext>
+          </a:extLst>
+        </p:spPr>
+      </p:pic>
+      <p:sp>
+        <p:nvSpPr>
+          <p:cNvPr id="3" name="Rectangle 2"/>
+          <p:cNvSpPr/>
+          <p:nvPr/>
+        </p:nvSpPr>
+        <p:spPr>
+          <a:xfrm>
+            <a:off x="-1" y="1435360"/>
+            <a:ext cx="3453651" cy="523220"/>
+          </a:xfrm>
+          <a:prstGeom prst="rect">
+            <a:avLst/>
+          </a:prstGeom>
+        </p:spPr>
+        <p:txBody>
+          <a:bodyPr wrap="square">
+            <a:spAutoFit/>
+          </a:bodyPr>
+          <a:lstStyle/>
+          <a:p>
+            <a:r>
+              <a:rPr lang="en-US" b="1" dirty="0" smtClean="0">
+                <a:solidFill>
+                  <a:schemeClr val="dk1"/>
+                </a:solidFill>
+                <a:latin typeface="Calibri"/>
+                <a:ea typeface="Calibri"/>
+                <a:cs typeface="Calibri"/>
+              </a:rPr>
+              <a:t>Case 01</a:t>
+            </a:r>
+            <a:r>
+              <a:rPr lang="en-US" dirty="0" smtClean="0">
+                <a:solidFill>
+                  <a:schemeClr val="dk1"/>
+                </a:solidFill>
+                <a:latin typeface="Calibri"/>
+                <a:ea typeface="Calibri"/>
+                <a:cs typeface="Calibri"/>
+              </a:rPr>
+              <a:t>: Permanently </a:t>
+            </a:r>
+            <a:r>
+              <a:rPr lang="en-US" dirty="0">
+                <a:solidFill>
+                  <a:schemeClr val="dk1"/>
+                </a:solidFill>
+                <a:latin typeface="Calibri"/>
+                <a:ea typeface="Calibri"/>
+                <a:cs typeface="Calibri"/>
+              </a:rPr>
+              <a:t>closing down up to 10 of the least used runs. </a:t>
+            </a:r>
+            <a:r>
+              <a:rPr lang="en-US" b="1" dirty="0" smtClean="0">
+                <a:solidFill>
+                  <a:schemeClr val="dk1"/>
+                </a:solidFill>
+                <a:latin typeface="Calibri"/>
+                <a:ea typeface="Calibri"/>
+                <a:cs typeface="Calibri"/>
+              </a:rPr>
+              <a:t>Decrease $3mil Rev</a:t>
+            </a:r>
+            <a:endParaRPr lang="en-US" b="1" dirty="0">
+              <a:solidFill>
+                <a:schemeClr val="dk1"/>
+              </a:solidFill>
+              <a:latin typeface="Calibri"/>
+              <a:ea typeface="Calibri"/>
+              <a:cs typeface="Calibri"/>
+            </a:endParaRPr>
+          </a:p>
+        </p:txBody>
+      </p:sp>
+      <p:pic>
+        <p:nvPicPr>
+          <p:cNvPr id="14" name="Picture 3"/>
+          <p:cNvPicPr>
+            <a:picLocks noChangeAspect="1" noChangeArrowheads="1"/>
+          </p:cNvPicPr>
+          <p:nvPr/>
+        </p:nvPicPr>
+        <p:blipFill>
+          <a:blip r:embed="rId5">
+            <a:extLst>
+              <a:ext uri="{28A0092B-C50C-407E-A947-70E740481C1C}">
+                <a14:useLocalDpi xmlns:a14="http://schemas.microsoft.com/office/drawing/2010/main" val="0"/>
+              </a:ext>
+            </a:extLst>
+          </a:blip>
+          <a:srcRect/>
+          <a:stretch>
+            <a:fillRect/>
+          </a:stretch>
+        </p:blipFill>
+        <p:spPr bwMode="auto">
+          <a:xfrm>
+            <a:off x="3339175" y="4528361"/>
+            <a:ext cx="3240000" cy="1749255"/>
+          </a:xfrm>
+          <a:prstGeom prst="rect">
+            <a:avLst/>
+          </a:prstGeom>
+          <a:noFill/>
+          <a:ln>
+            <a:noFill/>
+          </a:ln>
+          <a:extLst>
+            <a:ext uri="{909E8E84-426E-40DD-AFC4-6F175D3DCCD1}">
+              <a14:hiddenFill xmlns:a14="http://schemas.microsoft.com/office/drawing/2010/main">
+                <a:solidFill>
+                  <a:schemeClr val="accent1"/>
+                </a:solidFill>
+              </a14:hiddenFill>
+            </a:ext>
+            <a:ext uri="{91240B29-F687-4F45-9708-019B960494DF}">
+              <a14:hiddenLine xmlns:a14="http://schemas.microsoft.com/office/drawing/2010/main" w="9525">
+                <a:solidFill>
+                  <a:schemeClr val="tx1"/>
+                </a:solidFill>
+                <a:miter lim="800000"/>
+                <a:headEnd/>
+                <a:tailEnd/>
+              </a14:hiddenLine>
+            </a:ext>
+          </a:extLst>
+        </p:spPr>
+      </p:pic>
+      <p:sp>
+        <p:nvSpPr>
+          <p:cNvPr id="4" name="Rectangle 3"/>
+          <p:cNvSpPr/>
+          <p:nvPr/>
+        </p:nvSpPr>
+        <p:spPr>
+          <a:xfrm>
+            <a:off x="40059" y="3818906"/>
+            <a:ext cx="8033048" cy="738664"/>
+          </a:xfrm>
+          <a:prstGeom prst="rect">
+            <a:avLst/>
+          </a:prstGeom>
+        </p:spPr>
+        <p:txBody>
+          <a:bodyPr wrap="square">
+            <a:spAutoFit/>
+          </a:bodyPr>
+          <a:lstStyle/>
+          <a:p>
+            <a:r>
+              <a:rPr lang="en-US" b="1" dirty="0">
+                <a:solidFill>
+                  <a:schemeClr val="dk1"/>
+                </a:solidFill>
+                <a:latin typeface="Calibri"/>
+                <a:ea typeface="Calibri"/>
+                <a:cs typeface="Calibri"/>
+              </a:rPr>
+              <a:t>Case </a:t>
+            </a:r>
+            <a:r>
+              <a:rPr lang="en-US" b="1" dirty="0" smtClean="0">
+                <a:solidFill>
+                  <a:schemeClr val="dk1"/>
+                </a:solidFill>
+                <a:latin typeface="Calibri"/>
+                <a:ea typeface="Calibri"/>
+                <a:cs typeface="Calibri"/>
+              </a:rPr>
+              <a:t>02</a:t>
+            </a:r>
+            <a:r>
+              <a:rPr lang="en-US" dirty="0" smtClean="0">
+                <a:solidFill>
+                  <a:schemeClr val="dk1"/>
+                </a:solidFill>
+                <a:latin typeface="Calibri"/>
+                <a:ea typeface="Calibri"/>
+                <a:cs typeface="Calibri"/>
+              </a:rPr>
+              <a:t>:  Increase </a:t>
+            </a:r>
+            <a:r>
+              <a:rPr lang="en-US" dirty="0">
+                <a:solidFill>
+                  <a:schemeClr val="dk1"/>
+                </a:solidFill>
+                <a:latin typeface="Calibri"/>
+                <a:ea typeface="Calibri"/>
+                <a:cs typeface="Calibri"/>
+              </a:rPr>
+              <a:t>the vertical drop by adding a run to a point 150 feet lower down but requiring the installation of an additional chair lift to bring skiers back up, without additional snow making </a:t>
+            </a:r>
+            <a:r>
+              <a:rPr lang="en-US" dirty="0" smtClean="0">
+                <a:solidFill>
+                  <a:schemeClr val="dk1"/>
+                </a:solidFill>
+                <a:latin typeface="Calibri"/>
+                <a:ea typeface="Calibri"/>
+                <a:cs typeface="Calibri"/>
+              </a:rPr>
+              <a:t>coverage. </a:t>
+            </a:r>
+            <a:r>
+              <a:rPr lang="en-US" b="1" dirty="0" smtClean="0">
+                <a:solidFill>
+                  <a:schemeClr val="dk1"/>
+                </a:solidFill>
+                <a:latin typeface="Calibri"/>
+                <a:ea typeface="Calibri"/>
+                <a:cs typeface="Calibri"/>
+              </a:rPr>
+              <a:t>Increasing: Ticket $1.99, Revenue $3474638</a:t>
+            </a:r>
+            <a:endParaRPr lang="en-US" b="1" dirty="0">
+              <a:solidFill>
+                <a:schemeClr val="dk1"/>
+              </a:solidFill>
+              <a:latin typeface="Calibri"/>
+              <a:ea typeface="Calibri"/>
+              <a:cs typeface="Calibri"/>
+            </a:endParaRPr>
+          </a:p>
+        </p:txBody>
+      </p:sp>
+      <p:pic>
+        <p:nvPicPr>
+          <p:cNvPr id="16" name="Picture 6"/>
+          <p:cNvPicPr>
+            <a:picLocks noChangeAspect="1" noChangeArrowheads="1"/>
+          </p:cNvPicPr>
+          <p:nvPr/>
+        </p:nvPicPr>
+        <p:blipFill>
+          <a:blip r:embed="rId6">
+            <a:extLst>
+              <a:ext uri="{28A0092B-C50C-407E-A947-70E740481C1C}">
+                <a14:useLocalDpi xmlns:a14="http://schemas.microsoft.com/office/drawing/2010/main" val="0"/>
+              </a:ext>
+            </a:extLst>
+          </a:blip>
+          <a:srcRect/>
+          <a:stretch>
+            <a:fillRect/>
+          </a:stretch>
+        </p:blipFill>
+        <p:spPr bwMode="auto">
+          <a:xfrm>
+            <a:off x="0" y="4557570"/>
+            <a:ext cx="3240000" cy="1737392"/>
+          </a:xfrm>
+          <a:prstGeom prst="rect">
+            <a:avLst/>
+          </a:prstGeom>
+          <a:noFill/>
+          <a:ln>
+            <a:noFill/>
+          </a:ln>
+          <a:extLst>
+            <a:ext uri="{909E8E84-426E-40DD-AFC4-6F175D3DCCD1}">
+              <a14:hiddenFill xmlns:a14="http://schemas.microsoft.com/office/drawing/2010/main">
+                <a:solidFill>
+                  <a:schemeClr val="accent1"/>
+                </a:solidFill>
+              </a14:hiddenFill>
+            </a:ext>
+            <a:ext uri="{91240B29-F687-4F45-9708-019B960494DF}">
+              <a14:hiddenLine xmlns:a14="http://schemas.microsoft.com/office/drawing/2010/main" w="9525">
+                <a:solidFill>
+                  <a:schemeClr val="tx1"/>
+                </a:solidFill>
+                <a:miter lim="800000"/>
+                <a:headEnd/>
+                <a:tailEnd/>
+              </a14:hiddenLine>
+            </a:ext>
+          </a:extLst>
+        </p:spPr>
+      </p:pic>
+      <p:pic>
+        <p:nvPicPr>
+          <p:cNvPr id="17" name="Picture 2"/>
+          <p:cNvPicPr>
+            <a:picLocks noChangeAspect="1" noChangeArrowheads="1"/>
+          </p:cNvPicPr>
+          <p:nvPr/>
+        </p:nvPicPr>
+        <p:blipFill rotWithShape="1">
+          <a:blip r:embed="rId7">
+            <a:extLst>
+              <a:ext uri="{28A0092B-C50C-407E-A947-70E740481C1C}">
+                <a14:useLocalDpi xmlns:a14="http://schemas.microsoft.com/office/drawing/2010/main" val="0"/>
+              </a:ext>
+            </a:extLst>
+          </a:blip>
+          <a:srcRect r="50000"/>
+          <a:stretch/>
+        </p:blipFill>
+        <p:spPr bwMode="auto">
+          <a:xfrm>
+            <a:off x="6644855" y="4557570"/>
+            <a:ext cx="1620000" cy="1756781"/>
+          </a:xfrm>
+          <a:prstGeom prst="rect">
+            <a:avLst/>
+          </a:prstGeom>
+          <a:noFill/>
+          <a:ln>
+            <a:noFill/>
+          </a:ln>
+          <a:extLst>
+            <a:ext uri="{909E8E84-426E-40DD-AFC4-6F175D3DCCD1}">
+              <a14:hiddenFill xmlns:a14="http://schemas.microsoft.com/office/drawing/2010/main">
+                <a:solidFill>
+                  <a:schemeClr val="accent1"/>
+                </a:solidFill>
+              </a14:hiddenFill>
+            </a:ext>
+            <a:ext uri="{91240B29-F687-4F45-9708-019B960494DF}">
+              <a14:hiddenLine xmlns:a14="http://schemas.microsoft.com/office/drawing/2010/main" w="9525">
+                <a:solidFill>
+                  <a:schemeClr val="tx1"/>
+                </a:solidFill>
+                <a:miter lim="800000"/>
+                <a:headEnd/>
+                <a:tailEnd/>
+              </a14:hiddenLine>
+            </a:ext>
+          </a:extLst>
+        </p:spPr>
+      </p:pic>
+      <p:pic>
+        <p:nvPicPr>
+          <p:cNvPr id="18" name="Picture 3"/>
+          <p:cNvPicPr>
+            <a:picLocks noChangeAspect="1" noChangeArrowheads="1"/>
+          </p:cNvPicPr>
+          <p:nvPr/>
+        </p:nvPicPr>
+        <p:blipFill>
+          <a:blip r:embed="rId8">
+            <a:extLst>
+              <a:ext uri="{28A0092B-C50C-407E-A947-70E740481C1C}">
+                <a14:useLocalDpi xmlns:a14="http://schemas.microsoft.com/office/drawing/2010/main" val="0"/>
+              </a:ext>
+            </a:extLst>
+          </a:blip>
+          <a:srcRect/>
+          <a:stretch>
+            <a:fillRect/>
+          </a:stretch>
+        </p:blipFill>
+        <p:spPr bwMode="auto">
+          <a:xfrm>
+            <a:off x="3663477" y="1859508"/>
+            <a:ext cx="3240000" cy="1797085"/>
+          </a:xfrm>
+          <a:prstGeom prst="rect">
+            <a:avLst/>
+          </a:prstGeom>
+          <a:noFill/>
+          <a:ln>
+            <a:noFill/>
+          </a:ln>
+          <a:extLst>
+            <a:ext uri="{909E8E84-426E-40DD-AFC4-6F175D3DCCD1}">
+              <a14:hiddenFill xmlns:a14="http://schemas.microsoft.com/office/drawing/2010/main">
+                <a:solidFill>
+                  <a:schemeClr val="accent1"/>
+                </a:solidFill>
+              </a14:hiddenFill>
+            </a:ext>
+            <a:ext uri="{91240B29-F687-4F45-9708-019B960494DF}">
+              <a14:hiddenLine xmlns:a14="http://schemas.microsoft.com/office/drawing/2010/main" w="9525">
+                <a:solidFill>
+                  <a:schemeClr val="tx1"/>
+                </a:solidFill>
+                <a:miter lim="800000"/>
+                <a:headEnd/>
+                <a:tailEnd/>
+              </a14:hiddenLine>
+            </a:ext>
+          </a:extLst>
+        </p:spPr>
+      </p:pic>
+      <p:sp>
+        <p:nvSpPr>
+          <p:cNvPr id="5" name="Rectangle 4"/>
+          <p:cNvSpPr/>
+          <p:nvPr/>
+        </p:nvSpPr>
+        <p:spPr>
+          <a:xfrm>
+            <a:off x="3453650" y="1435360"/>
+            <a:ext cx="3535290" cy="523220"/>
+          </a:xfrm>
+          <a:prstGeom prst="rect">
+            <a:avLst/>
+          </a:prstGeom>
+        </p:spPr>
+        <p:txBody>
+          <a:bodyPr wrap="square">
+            <a:spAutoFit/>
+          </a:bodyPr>
+          <a:lstStyle/>
+          <a:p>
+            <a:r>
+              <a:rPr lang="en-US" b="1" dirty="0">
+                <a:solidFill>
+                  <a:schemeClr val="dk1"/>
+                </a:solidFill>
+                <a:latin typeface="Calibri"/>
+                <a:ea typeface="Calibri"/>
+                <a:cs typeface="Calibri"/>
+              </a:rPr>
+              <a:t>Case </a:t>
+            </a:r>
+            <a:r>
+              <a:rPr lang="en-US" b="1" dirty="0" smtClean="0">
+                <a:solidFill>
+                  <a:schemeClr val="dk1"/>
+                </a:solidFill>
+                <a:latin typeface="Calibri"/>
+                <a:ea typeface="Calibri"/>
+                <a:cs typeface="Calibri"/>
+              </a:rPr>
+              <a:t>03</a:t>
+            </a:r>
+            <a:r>
+              <a:rPr lang="en-US" dirty="0" smtClean="0">
+                <a:solidFill>
+                  <a:schemeClr val="dk1"/>
+                </a:solidFill>
+                <a:latin typeface="Calibri"/>
+                <a:ea typeface="Calibri"/>
+                <a:cs typeface="Calibri"/>
+              </a:rPr>
+              <a:t>:  Same </a:t>
+            </a:r>
+            <a:r>
+              <a:rPr lang="en-US" dirty="0">
+                <a:solidFill>
+                  <a:schemeClr val="dk1"/>
+                </a:solidFill>
+                <a:latin typeface="Calibri"/>
+                <a:ea typeface="Calibri"/>
+                <a:cs typeface="Calibri"/>
+              </a:rPr>
+              <a:t>as case 2, but adding 2 acres of snow making </a:t>
+            </a:r>
+            <a:r>
+              <a:rPr lang="en-US" dirty="0" smtClean="0">
+                <a:solidFill>
+                  <a:schemeClr val="dk1"/>
+                </a:solidFill>
+                <a:latin typeface="Calibri"/>
+                <a:ea typeface="Calibri"/>
+                <a:cs typeface="Calibri"/>
+              </a:rPr>
+              <a:t>cover. </a:t>
+            </a:r>
+            <a:r>
+              <a:rPr lang="en-US" b="1" dirty="0" smtClean="0">
+                <a:solidFill>
+                  <a:schemeClr val="dk1"/>
+                </a:solidFill>
+                <a:latin typeface="Calibri"/>
+                <a:ea typeface="Calibri"/>
+                <a:cs typeface="Calibri"/>
+              </a:rPr>
+              <a:t>Same as case 02</a:t>
+            </a:r>
+            <a:endParaRPr lang="en-US" b="1" dirty="0">
+              <a:solidFill>
+                <a:schemeClr val="dk1"/>
+              </a:solidFill>
+              <a:latin typeface="Calibri"/>
+              <a:ea typeface="Calibri"/>
+              <a:cs typeface="Calibri"/>
+            </a:endParaRPr>
+          </a:p>
+        </p:txBody>
+      </p:sp>
+      <p:sp>
+        <p:nvSpPr>
+          <p:cNvPr id="6" name="Rectangle 5"/>
+          <p:cNvSpPr/>
+          <p:nvPr/>
+        </p:nvSpPr>
+        <p:spPr>
+          <a:xfrm>
+            <a:off x="6903476" y="1427088"/>
+            <a:ext cx="3014874" cy="954107"/>
+          </a:xfrm>
+          <a:prstGeom prst="rect">
+            <a:avLst/>
+          </a:prstGeom>
+        </p:spPr>
+        <p:txBody>
+          <a:bodyPr wrap="square">
+            <a:spAutoFit/>
+          </a:bodyPr>
+          <a:lstStyle/>
+          <a:p>
+            <a:r>
+              <a:rPr lang="en-US" b="1" dirty="0">
+                <a:solidFill>
+                  <a:schemeClr val="dk1"/>
+                </a:solidFill>
+                <a:latin typeface="Calibri"/>
+                <a:ea typeface="Calibri"/>
+                <a:cs typeface="Calibri"/>
+              </a:rPr>
+              <a:t>Case </a:t>
+            </a:r>
+            <a:r>
+              <a:rPr lang="en-US" b="1" dirty="0" smtClean="0">
+                <a:solidFill>
+                  <a:schemeClr val="dk1"/>
+                </a:solidFill>
+                <a:latin typeface="Calibri"/>
+                <a:ea typeface="Calibri"/>
+                <a:cs typeface="Calibri"/>
+              </a:rPr>
+              <a:t>04</a:t>
+            </a:r>
+            <a:r>
+              <a:rPr lang="en-US" dirty="0" smtClean="0">
+                <a:solidFill>
+                  <a:schemeClr val="dk1"/>
+                </a:solidFill>
+                <a:latin typeface="Calibri"/>
+                <a:ea typeface="Calibri"/>
+                <a:cs typeface="Calibri"/>
+              </a:rPr>
+              <a:t>:  Increase </a:t>
+            </a:r>
+            <a:r>
+              <a:rPr lang="en-US" dirty="0">
+                <a:solidFill>
+                  <a:schemeClr val="dk1"/>
+                </a:solidFill>
+                <a:latin typeface="Calibri"/>
+                <a:ea typeface="Calibri"/>
+                <a:cs typeface="Calibri"/>
+              </a:rPr>
+              <a:t>the longest run by 0.2 mile to boast 3.5 miles length, requiring an additional snow making coverage of 4 </a:t>
+            </a:r>
+            <a:r>
+              <a:rPr lang="en-US" dirty="0" smtClean="0">
+                <a:solidFill>
+                  <a:schemeClr val="dk1"/>
+                </a:solidFill>
+                <a:latin typeface="Calibri"/>
+                <a:ea typeface="Calibri"/>
+                <a:cs typeface="Calibri"/>
+              </a:rPr>
+              <a:t>acres. </a:t>
+            </a:r>
+            <a:r>
+              <a:rPr lang="en-US" b="1" dirty="0">
+                <a:solidFill>
+                  <a:schemeClr val="dk1"/>
+                </a:solidFill>
+                <a:latin typeface="Calibri"/>
+                <a:ea typeface="Calibri"/>
+                <a:cs typeface="Calibri"/>
+              </a:rPr>
+              <a:t>Same as case 02</a:t>
+            </a:r>
+          </a:p>
+        </p:txBody>
+      </p:sp>
+      <p:pic>
+        <p:nvPicPr>
+          <p:cNvPr id="21" name="Picture 7"/>
+          <p:cNvPicPr>
+            <a:picLocks noChangeAspect="1" noChangeArrowheads="1"/>
+          </p:cNvPicPr>
+          <p:nvPr/>
+        </p:nvPicPr>
+        <p:blipFill rotWithShape="1">
+          <a:blip r:embed="rId9">
+            <a:extLst>
+              <a:ext uri="{28A0092B-C50C-407E-A947-70E740481C1C}">
+                <a14:useLocalDpi xmlns:a14="http://schemas.microsoft.com/office/drawing/2010/main" val="0"/>
+              </a:ext>
+            </a:extLst>
+          </a:blip>
+          <a:srcRect r="48474"/>
+          <a:stretch/>
+        </p:blipFill>
+        <p:spPr bwMode="auto">
+          <a:xfrm>
+            <a:off x="8101413" y="2324166"/>
+            <a:ext cx="1669444" cy="1716279"/>
+          </a:xfrm>
+          <a:prstGeom prst="rect">
+            <a:avLst/>
+          </a:prstGeom>
+          <a:noFill/>
+          <a:ln>
+            <a:noFill/>
+          </a:ln>
+          <a:extLst>
+            <a:ext uri="{909E8E84-426E-40DD-AFC4-6F175D3DCCD1}">
+              <a14:hiddenFill xmlns:a14="http://schemas.microsoft.com/office/drawing/2010/main">
+                <a:solidFill>
+                  <a:schemeClr val="accent1"/>
+                </a:solidFill>
+              </a14:hiddenFill>
+            </a:ext>
+            <a:ext uri="{91240B29-F687-4F45-9708-019B960494DF}">
+              <a14:hiddenLine xmlns:a14="http://schemas.microsoft.com/office/drawing/2010/main" w="9525">
+                <a:solidFill>
+                  <a:schemeClr val="tx1"/>
+                </a:solidFill>
+                <a:miter lim="800000"/>
+                <a:headEnd/>
+                <a:tailEnd/>
+              </a14:hiddenLine>
+            </a:ext>
+          </a:extLst>
+        </p:spPr>
+      </p:pic>
     </p:spTree>
     <p:extLst>
       <p:ext uri="{BB962C8B-B14F-4D97-AF65-F5344CB8AC3E}">
-        <p14:creationId xmlns:p14="http://schemas.microsoft.com/office/powerpoint/2010/main" val="2245005670"/>
+        <p14:creationId xmlns:p14="http://schemas.microsoft.com/office/powerpoint/2010/main" val="1020951880"/>
       </p:ext>
     </p:extLst>
   </p:cSld>
@@ -6930,6 +7468,401 @@
       </p:pic>
       <p:sp>
         <p:nvSpPr>
+          <p:cNvPr id="196" name="Google Shape;196;p28"/>
+          <p:cNvSpPr txBox="1"/>
+          <p:nvPr/>
+        </p:nvSpPr>
+        <p:spPr>
+          <a:xfrm>
+            <a:off x="0" y="862036"/>
+            <a:ext cx="9906000" cy="3880880"/>
+          </a:xfrm>
+          <a:prstGeom prst="rect">
+            <a:avLst/>
+          </a:prstGeom>
+          <a:noFill/>
+          <a:ln>
+            <a:noFill/>
+          </a:ln>
+        </p:spPr>
+        <p:txBody>
+          <a:bodyPr spcFirstLastPara="1" wrap="square" lIns="91425" tIns="91425" rIns="91425" bIns="91425" anchor="t" anchorCtr="0">
+            <a:noAutofit/>
+          </a:bodyPr>
+          <a:lstStyle/>
+          <a:p>
+            <a:pPr marL="285750" indent="-285750">
+              <a:buFont typeface="Arial" panose="020B0604020202020204" pitchFamily="34" charset="0"/>
+              <a:buChar char="•"/>
+            </a:pPr>
+            <a:r>
+              <a:rPr lang="en-US" sz="1600" dirty="0" smtClean="0"/>
+              <a:t>BMR </a:t>
+            </a:r>
+            <a:r>
+              <a:rPr lang="en-US" sz="1600" dirty="0"/>
+              <a:t>price has been predicted is $95.87 using Random Forest model excluding BMR info vs $81 actual one. It means that it still has room to increase ticket price then revenue</a:t>
+            </a:r>
+            <a:r>
+              <a:rPr lang="en-US" sz="1600" dirty="0" smtClean="0"/>
+              <a:t>.</a:t>
+            </a:r>
+          </a:p>
+          <a:p>
+            <a:pPr marL="285750" indent="-285750">
+              <a:buFont typeface="Arial" panose="020B0604020202020204" pitchFamily="34" charset="0"/>
+              <a:buChar char="•"/>
+            </a:pPr>
+            <a:endParaRPr lang="en-US" sz="1600" dirty="0"/>
+          </a:p>
+          <a:p>
+            <a:pPr marL="285750" indent="-285750">
+              <a:buFont typeface="Arial" panose="020B0604020202020204" pitchFamily="34" charset="0"/>
+              <a:buChar char="•"/>
+            </a:pPr>
+            <a:r>
+              <a:rPr lang="en-US" sz="1600" dirty="0"/>
+              <a:t>04 </a:t>
+            </a:r>
+            <a:r>
+              <a:rPr lang="en-US" sz="1600" dirty="0" err="1"/>
+              <a:t>scienarios</a:t>
+            </a:r>
+            <a:r>
+              <a:rPr lang="en-US" sz="1600" dirty="0"/>
+              <a:t> have been run to reveal the variation of ticket price when key features/facilities change. The results showing that number of Runs, </a:t>
+            </a:r>
+            <a:r>
+              <a:rPr lang="en-US" sz="1600" dirty="0" err="1"/>
+              <a:t>vertical_drop</a:t>
+            </a:r>
+            <a:r>
+              <a:rPr lang="en-US" sz="1600" dirty="0"/>
+              <a:t> &amp; </a:t>
+            </a:r>
+            <a:r>
+              <a:rPr lang="en-US" sz="1600" dirty="0" err="1"/>
+              <a:t>total_chairs</a:t>
+            </a:r>
+            <a:r>
+              <a:rPr lang="en-US" sz="1600" dirty="0"/>
+              <a:t> are the most effected features to the ticket price &amp; revenue. The suggested price increase is $1.9 leading an increasing of $3474638 in revenue over a season</a:t>
+            </a:r>
+            <a:r>
+              <a:rPr lang="en-US" sz="1600" dirty="0" smtClean="0"/>
+              <a:t>.</a:t>
+            </a:r>
+          </a:p>
+          <a:p>
+            <a:pPr marL="285750" indent="-285750">
+              <a:buFont typeface="Arial" panose="020B0604020202020204" pitchFamily="34" charset="0"/>
+              <a:buChar char="•"/>
+            </a:pPr>
+            <a:endParaRPr lang="en-US" sz="1600" dirty="0"/>
+          </a:p>
+          <a:p>
+            <a:pPr marL="285750" indent="-285750">
+              <a:buFont typeface="Arial" panose="020B0604020202020204" pitchFamily="34" charset="0"/>
+              <a:buChar char="•"/>
+            </a:pPr>
+            <a:r>
+              <a:rPr lang="en-US" sz="1600" dirty="0"/>
+              <a:t>Continue running the model by increasing number of Runs, an interesting number of revenue increase is $5123188 meanwhile ticket price is only higher $2.93. By playing around with many other cases might reach an optimum </a:t>
+            </a:r>
+            <a:r>
+              <a:rPr lang="en-US" sz="1600" dirty="0" smtClean="0"/>
+              <a:t>solution.</a:t>
+            </a:r>
+            <a:endParaRPr lang="en-US" sz="1600" dirty="0"/>
+          </a:p>
+          <a:p>
+            <a:pPr marL="457200" lvl="0" indent="-330200" algn="l" rtl="0">
+              <a:spcBef>
+                <a:spcPts val="0"/>
+              </a:spcBef>
+              <a:spcAft>
+                <a:spcPts val="0"/>
+              </a:spcAft>
+              <a:buClr>
+                <a:schemeClr val="dk1"/>
+              </a:buClr>
+              <a:buSzPts val="1600"/>
+              <a:buFont typeface="Calibri"/>
+              <a:buAutoNum type="arabicPeriod" startAt="4"/>
+            </a:pPr>
+            <a:endParaRPr sz="1600" dirty="0">
+              <a:solidFill>
+                <a:schemeClr val="dk1"/>
+              </a:solidFill>
+              <a:latin typeface="Calibri"/>
+              <a:ea typeface="Calibri"/>
+              <a:cs typeface="Calibri"/>
+              <a:sym typeface="Calibri"/>
+            </a:endParaRPr>
+          </a:p>
+          <a:p>
+            <a:pPr marL="457200" lvl="0" indent="0" algn="l" rtl="0">
+              <a:spcBef>
+                <a:spcPts val="0"/>
+              </a:spcBef>
+              <a:spcAft>
+                <a:spcPts val="0"/>
+              </a:spcAft>
+              <a:buNone/>
+            </a:pPr>
+            <a:endParaRPr sz="1600" dirty="0">
+              <a:solidFill>
+                <a:schemeClr val="dk1"/>
+              </a:solidFill>
+              <a:latin typeface="Calibri"/>
+              <a:ea typeface="Calibri"/>
+              <a:cs typeface="Calibri"/>
+              <a:sym typeface="Calibri"/>
+            </a:endParaRPr>
+          </a:p>
+          <a:p>
+            <a:pPr marL="457200" lvl="0" indent="0" algn="l" rtl="0">
+              <a:spcBef>
+                <a:spcPts val="0"/>
+              </a:spcBef>
+              <a:spcAft>
+                <a:spcPts val="0"/>
+              </a:spcAft>
+              <a:buNone/>
+            </a:pPr>
+            <a:endParaRPr sz="1600" dirty="0">
+              <a:solidFill>
+                <a:schemeClr val="dk1"/>
+              </a:solidFill>
+              <a:latin typeface="Calibri"/>
+              <a:ea typeface="Calibri"/>
+              <a:cs typeface="Calibri"/>
+              <a:sym typeface="Calibri"/>
+            </a:endParaRPr>
+          </a:p>
+          <a:p>
+            <a:pPr marL="457200" lvl="0" indent="0" algn="l" rtl="0">
+              <a:spcBef>
+                <a:spcPts val="0"/>
+              </a:spcBef>
+              <a:spcAft>
+                <a:spcPts val="0"/>
+              </a:spcAft>
+              <a:buNone/>
+            </a:pPr>
+            <a:endParaRPr sz="1600" dirty="0">
+              <a:solidFill>
+                <a:schemeClr val="dk1"/>
+              </a:solidFill>
+              <a:latin typeface="Calibri"/>
+              <a:ea typeface="Calibri"/>
+              <a:cs typeface="Calibri"/>
+              <a:sym typeface="Calibri"/>
+            </a:endParaRPr>
+          </a:p>
+          <a:p>
+            <a:pPr marL="457200" lvl="0" indent="0" algn="l" rtl="0">
+              <a:spcBef>
+                <a:spcPts val="0"/>
+              </a:spcBef>
+              <a:spcAft>
+                <a:spcPts val="0"/>
+              </a:spcAft>
+              <a:buNone/>
+            </a:pPr>
+            <a:endParaRPr sz="1600" dirty="0">
+              <a:solidFill>
+                <a:schemeClr val="dk1"/>
+              </a:solidFill>
+              <a:latin typeface="Calibri"/>
+              <a:ea typeface="Calibri"/>
+              <a:cs typeface="Calibri"/>
+              <a:sym typeface="Calibri"/>
+            </a:endParaRPr>
+          </a:p>
+          <a:p>
+            <a:pPr marL="457200" lvl="0" indent="0" algn="l" rtl="0">
+              <a:spcBef>
+                <a:spcPts val="0"/>
+              </a:spcBef>
+              <a:spcAft>
+                <a:spcPts val="0"/>
+              </a:spcAft>
+              <a:buNone/>
+            </a:pPr>
+            <a:endParaRPr sz="1600" dirty="0">
+              <a:solidFill>
+                <a:schemeClr val="dk1"/>
+              </a:solidFill>
+              <a:latin typeface="Calibri"/>
+              <a:ea typeface="Calibri"/>
+              <a:cs typeface="Calibri"/>
+              <a:sym typeface="Calibri"/>
+            </a:endParaRPr>
+          </a:p>
+          <a:p>
+            <a:pPr marL="457200" lvl="0" indent="0" algn="l" rtl="0">
+              <a:spcBef>
+                <a:spcPts val="0"/>
+              </a:spcBef>
+              <a:spcAft>
+                <a:spcPts val="0"/>
+              </a:spcAft>
+              <a:buNone/>
+            </a:pPr>
+            <a:endParaRPr sz="1600" dirty="0">
+              <a:solidFill>
+                <a:schemeClr val="dk1"/>
+              </a:solidFill>
+              <a:latin typeface="Calibri"/>
+              <a:ea typeface="Calibri"/>
+              <a:cs typeface="Calibri"/>
+              <a:sym typeface="Calibri"/>
+            </a:endParaRPr>
+          </a:p>
+          <a:p>
+            <a:pPr marL="457200" lvl="0" indent="0" algn="l" rtl="0">
+              <a:spcBef>
+                <a:spcPts val="0"/>
+              </a:spcBef>
+              <a:spcAft>
+                <a:spcPts val="0"/>
+              </a:spcAft>
+              <a:buNone/>
+            </a:pPr>
+            <a:endParaRPr sz="1600" dirty="0">
+              <a:solidFill>
+                <a:schemeClr val="dk1"/>
+              </a:solidFill>
+              <a:latin typeface="Calibri"/>
+              <a:ea typeface="Calibri"/>
+              <a:cs typeface="Calibri"/>
+              <a:sym typeface="Calibri"/>
+            </a:endParaRPr>
+          </a:p>
+          <a:p>
+            <a:pPr marL="457200" lvl="0" indent="0" algn="l" rtl="0">
+              <a:spcBef>
+                <a:spcPts val="0"/>
+              </a:spcBef>
+              <a:spcAft>
+                <a:spcPts val="0"/>
+              </a:spcAft>
+              <a:buNone/>
+            </a:pPr>
+            <a:endParaRPr sz="1600" dirty="0">
+              <a:solidFill>
+                <a:schemeClr val="dk1"/>
+              </a:solidFill>
+              <a:latin typeface="Calibri"/>
+              <a:ea typeface="Calibri"/>
+              <a:cs typeface="Calibri"/>
+              <a:sym typeface="Calibri"/>
+            </a:endParaRPr>
+          </a:p>
+          <a:p>
+            <a:pPr marL="457200" lvl="0" indent="0" algn="l" rtl="0">
+              <a:spcBef>
+                <a:spcPts val="0"/>
+              </a:spcBef>
+              <a:spcAft>
+                <a:spcPts val="0"/>
+              </a:spcAft>
+              <a:buNone/>
+            </a:pPr>
+            <a:endParaRPr sz="1600" dirty="0">
+              <a:solidFill>
+                <a:schemeClr val="dk1"/>
+              </a:solidFill>
+              <a:latin typeface="Calibri"/>
+              <a:ea typeface="Calibri"/>
+              <a:cs typeface="Calibri"/>
+              <a:sym typeface="Calibri"/>
+            </a:endParaRPr>
+          </a:p>
+          <a:p>
+            <a:pPr marL="457200" lvl="0" indent="0" algn="l" rtl="0">
+              <a:spcBef>
+                <a:spcPts val="0"/>
+              </a:spcBef>
+              <a:spcAft>
+                <a:spcPts val="0"/>
+              </a:spcAft>
+              <a:buNone/>
+            </a:pPr>
+            <a:endParaRPr sz="1600" dirty="0">
+              <a:solidFill>
+                <a:schemeClr val="dk1"/>
+              </a:solidFill>
+              <a:latin typeface="Calibri"/>
+              <a:ea typeface="Calibri"/>
+              <a:cs typeface="Calibri"/>
+              <a:sym typeface="Calibri"/>
+            </a:endParaRPr>
+          </a:p>
+          <a:p>
+            <a:pPr marL="457200" lvl="0" indent="0" algn="l" rtl="0">
+              <a:spcBef>
+                <a:spcPts val="0"/>
+              </a:spcBef>
+              <a:spcAft>
+                <a:spcPts val="0"/>
+              </a:spcAft>
+              <a:buClr>
+                <a:schemeClr val="dk1"/>
+              </a:buClr>
+              <a:buSzPts val="1100"/>
+              <a:buFont typeface="Arial"/>
+              <a:buNone/>
+            </a:pPr>
+            <a:endParaRPr sz="1600" dirty="0">
+              <a:solidFill>
+                <a:schemeClr val="dk1"/>
+              </a:solidFill>
+              <a:latin typeface="Calibri"/>
+              <a:ea typeface="Calibri"/>
+              <a:cs typeface="Calibri"/>
+              <a:sym typeface="Calibri"/>
+            </a:endParaRPr>
+          </a:p>
+          <a:p>
+            <a:pPr marL="0" lvl="0" indent="0" algn="l" rtl="0">
+              <a:spcBef>
+                <a:spcPts val="0"/>
+              </a:spcBef>
+              <a:spcAft>
+                <a:spcPts val="0"/>
+              </a:spcAft>
+              <a:buNone/>
+            </a:pPr>
+            <a:endParaRPr sz="1600" b="1" dirty="0">
+              <a:latin typeface="Calibri"/>
+              <a:ea typeface="Calibri"/>
+              <a:cs typeface="Calibri"/>
+              <a:sym typeface="Calibri"/>
+            </a:endParaRPr>
+          </a:p>
+          <a:p>
+            <a:pPr marL="457200" lvl="0" indent="0" algn="l" rtl="0">
+              <a:spcBef>
+                <a:spcPts val="0"/>
+              </a:spcBef>
+              <a:spcAft>
+                <a:spcPts val="0"/>
+              </a:spcAft>
+              <a:buNone/>
+            </a:pPr>
+            <a:endParaRPr sz="1600" dirty="0">
+              <a:latin typeface="Calibri"/>
+              <a:ea typeface="Calibri"/>
+              <a:cs typeface="Calibri"/>
+              <a:sym typeface="Calibri"/>
+            </a:endParaRPr>
+          </a:p>
+        </p:txBody>
+      </p:sp>
+      <p:sp>
+        <p:nvSpPr>
           <p:cNvPr id="204" name="Google Shape;204;p28"/>
           <p:cNvSpPr txBox="1">
             <a:spLocks noGrp="1"/>
@@ -6976,6 +7909,206 @@
       </p:sp>
       <p:sp>
         <p:nvSpPr>
+          <p:cNvPr id="10" name="Google Shape;186;p27"/>
+          <p:cNvSpPr txBox="1"/>
+          <p:nvPr/>
+        </p:nvSpPr>
+        <p:spPr>
+          <a:xfrm>
+            <a:off x="0" y="7633"/>
+            <a:ext cx="9918350" cy="854400"/>
+          </a:xfrm>
+          <a:prstGeom prst="rect">
+            <a:avLst/>
+          </a:prstGeom>
+          <a:solidFill>
+            <a:srgbClr val="0B5394"/>
+          </a:solidFill>
+          <a:ln>
+            <a:noFill/>
+          </a:ln>
+        </p:spPr>
+        <p:txBody>
+          <a:bodyPr spcFirstLastPara="1" wrap="square" lIns="91425" tIns="91425" rIns="91425" bIns="91425" anchor="t" anchorCtr="0">
+            <a:noAutofit/>
+          </a:bodyPr>
+          <a:lstStyle/>
+          <a:p>
+            <a:pPr lvl="0" algn="ctr"/>
+            <a:r>
+              <a:rPr lang="en-US" sz="2200" dirty="0">
+                <a:solidFill>
+                  <a:schemeClr val="accent5"/>
+                </a:solidFill>
+                <a:latin typeface="Calibri"/>
+                <a:ea typeface="Calibri"/>
+                <a:cs typeface="Calibri"/>
+                <a:sym typeface="Calibri"/>
+              </a:rPr>
+              <a:t>Project</a:t>
+            </a:r>
+            <a:r>
+              <a:rPr lang="en-US" sz="3000" dirty="0">
+                <a:solidFill>
+                  <a:srgbClr val="FFFFFF"/>
+                </a:solidFill>
+                <a:latin typeface="Calibri"/>
+                <a:ea typeface="Calibri"/>
+                <a:cs typeface="Calibri"/>
+                <a:sym typeface="Calibri"/>
+              </a:rPr>
+              <a:t> </a:t>
+            </a:r>
+            <a:r>
+              <a:rPr lang="en-US" sz="2800" b="1" dirty="0" smtClean="0">
+                <a:solidFill>
+                  <a:srgbClr val="F3F3F3"/>
+                </a:solidFill>
+                <a:latin typeface="Roboto"/>
+                <a:ea typeface="Roboto"/>
+                <a:cs typeface="Roboto"/>
+                <a:sym typeface="Roboto"/>
+              </a:rPr>
+              <a:t>Big Mountain Resort Ticket Price</a:t>
+            </a:r>
+          </a:p>
+          <a:p>
+            <a:pPr lvl="0" algn="ctr"/>
+            <a:r>
+              <a:rPr lang="en-US" sz="2000" b="1" dirty="0" smtClean="0">
+                <a:solidFill>
+                  <a:schemeClr val="tx2">
+                    <a:lumMod val="60000"/>
+                    <a:lumOff val="40000"/>
+                  </a:schemeClr>
+                </a:solidFill>
+                <a:latin typeface="Roboto"/>
+                <a:ea typeface="Calibri"/>
+                <a:cs typeface="Calibri"/>
+                <a:sym typeface="Roboto"/>
+              </a:rPr>
+              <a:t>Modeling Results &amp; Analysis</a:t>
+            </a:r>
+            <a:endParaRPr sz="2000" dirty="0">
+              <a:solidFill>
+                <a:schemeClr val="tx2">
+                  <a:lumMod val="60000"/>
+                  <a:lumOff val="40000"/>
+                </a:schemeClr>
+              </a:solidFill>
+              <a:latin typeface="Calibri"/>
+              <a:ea typeface="Calibri"/>
+              <a:cs typeface="Calibri"/>
+              <a:sym typeface="Calibri"/>
+            </a:endParaRPr>
+          </a:p>
+        </p:txBody>
+      </p:sp>
+    </p:spTree>
+    <p:extLst>
+      <p:ext uri="{BB962C8B-B14F-4D97-AF65-F5344CB8AC3E}">
+        <p14:creationId xmlns:p14="http://schemas.microsoft.com/office/powerpoint/2010/main" val="2245005670"/>
+      </p:ext>
+    </p:extLst>
+  </p:cSld>
+  <p:clrMapOvr>
+    <a:masterClrMapping/>
+  </p:clrMapOvr>
+</p:sld>
+</file>
+
+<file path=ppt/slides/slide12.xml><?xml version="1.0" encoding="utf-8"?>
+<p:sld xmlns:a="http://schemas.openxmlformats.org/drawingml/2006/main" xmlns:r="http://schemas.openxmlformats.org/officeDocument/2006/relationships" xmlns:p="http://schemas.openxmlformats.org/presentationml/2006/main">
+  <p:cSld>
+    <p:spTree>
+      <p:nvGrpSpPr>
+        <p:cNvPr id="1" name="Shape 193"/>
+        <p:cNvGrpSpPr/>
+        <p:nvPr/>
+      </p:nvGrpSpPr>
+      <p:grpSpPr>
+        <a:xfrm>
+          <a:off x="0" y="0"/>
+          <a:ext cx="0" cy="0"/>
+          <a:chOff x="0" y="0"/>
+          <a:chExt cx="0" cy="0"/>
+        </a:xfrm>
+      </p:grpSpPr>
+      <p:pic>
+        <p:nvPicPr>
+          <p:cNvPr id="194" name="Google Shape;194;p28" descr="springboard-logo-secondary-RGB.png"/>
+          <p:cNvPicPr preferRelativeResize="0"/>
+          <p:nvPr/>
+        </p:nvPicPr>
+        <p:blipFill rotWithShape="1">
+          <a:blip r:embed="rId3">
+            <a:alphaModFix/>
+          </a:blip>
+          <a:srcRect/>
+          <a:stretch/>
+        </p:blipFill>
+        <p:spPr>
+          <a:xfrm>
+            <a:off x="0" y="6055089"/>
+            <a:ext cx="1485900" cy="914400"/>
+          </a:xfrm>
+          <a:prstGeom prst="rect">
+            <a:avLst/>
+          </a:prstGeom>
+          <a:noFill/>
+          <a:ln>
+            <a:noFill/>
+          </a:ln>
+        </p:spPr>
+      </p:pic>
+      <p:sp>
+        <p:nvSpPr>
+          <p:cNvPr id="204" name="Google Shape;204;p28"/>
+          <p:cNvSpPr txBox="1">
+            <a:spLocks noGrp="1"/>
+          </p:cNvSpPr>
+          <p:nvPr>
+            <p:ph type="sldNum" idx="12"/>
+          </p:nvPr>
+        </p:nvSpPr>
+        <p:spPr>
+          <a:xfrm>
+            <a:off x="7099300" y="6356352"/>
+            <a:ext cx="2311400" cy="365200"/>
+          </a:xfrm>
+          <a:prstGeom prst="rect">
+            <a:avLst/>
+          </a:prstGeom>
+        </p:spPr>
+        <p:txBody>
+          <a:bodyPr spcFirstLastPara="1" wrap="square" lIns="68575" tIns="34275" rIns="68575" bIns="34275" anchor="ctr" anchorCtr="0">
+            <a:noAutofit/>
+          </a:bodyPr>
+          <a:lstStyle/>
+          <a:p>
+            <a:pPr marL="0" lvl="0" indent="0" algn="r" rtl="0">
+              <a:spcBef>
+                <a:spcPts val="0"/>
+              </a:spcBef>
+              <a:spcAft>
+                <a:spcPts val="0"/>
+              </a:spcAft>
+              <a:buClr>
+                <a:srgbClr val="000000"/>
+              </a:buClr>
+              <a:buFont typeface="Arial"/>
+              <a:buNone/>
+            </a:pPr>
+            <a:fld id="{00000000-1234-1234-1234-123412341234}" type="slidenum">
+              <a:rPr lang="en-US"/>
+              <a:t>12</a:t>
+            </a:fld>
+            <a:endParaRPr/>
+          </a:p>
+        </p:txBody>
+      </p:sp>
+      <p:sp>
+        <p:nvSpPr>
           <p:cNvPr id="19" name="Google Shape;211;p29"/>
           <p:cNvSpPr txBox="1"/>
           <p:nvPr/>
@@ -7013,15 +8146,7 @@
                 <a:ea typeface="Calibri"/>
                 <a:cs typeface="Calibri"/>
               </a:rPr>
-              <a:t>The </a:t>
-            </a:r>
-            <a:r>
-              <a:rPr lang="en-US" sz="1600" dirty="0">
-                <a:latin typeface="Calibri"/>
-                <a:ea typeface="Calibri"/>
-                <a:cs typeface="Calibri"/>
-              </a:rPr>
-              <a:t>suggested price increase is $1.9 leading an increasing of $3474638 in revenue over a </a:t>
+              <a:t>The suggested price increase is $1.9 leading an increasing of $3474638 in revenue over a </a:t>
             </a:r>
             <a:r>
               <a:rPr lang="en-US" sz="1600" dirty="0" smtClean="0">
@@ -9762,22 +10887,7 @@
                 <a:cs typeface="Calibri"/>
                 <a:sym typeface="Roboto"/>
               </a:rPr>
-              <a:t>Findings &amp; </a:t>
-            </a:r>
-            <a:r>
-              <a:rPr lang="en-US" sz="2000" b="1" dirty="0">
-                <a:solidFill>
-                  <a:schemeClr val="tx2">
-                    <a:lumMod val="60000"/>
-                    <a:lumOff val="40000"/>
-                  </a:schemeClr>
-                </a:solidFill>
-                <a:latin typeface="Roboto"/>
-                <a:ea typeface="Calibri"/>
-                <a:cs typeface="Calibri"/>
-                <a:sym typeface="Roboto"/>
-              </a:rPr>
-              <a:t>Recommendations </a:t>
+              <a:t>Features Description &amp; Abbreviation</a:t>
             </a:r>
             <a:endParaRPr sz="2000" dirty="0">
               <a:solidFill>
@@ -9835,6 +10945,493 @@
             <a:fld id="{00000000-1234-1234-1234-123412341234}" type="slidenum">
               <a:rPr lang="en-US" smtClean="0"/>
               <a:t>4</a:t>
+            </a:fld>
+            <a:endParaRPr dirty="0"/>
+          </a:p>
+        </p:txBody>
+      </p:sp>
+      <p:pic>
+        <p:nvPicPr>
+          <p:cNvPr id="16" name="Picture 2"/>
+          <p:cNvPicPr>
+            <a:picLocks noChangeAspect="1" noChangeArrowheads="1"/>
+          </p:cNvPicPr>
+          <p:nvPr/>
+        </p:nvPicPr>
+        <p:blipFill>
+          <a:blip r:embed="rId4">
+            <a:extLst>
+              <a:ext uri="{28A0092B-C50C-407E-A947-70E740481C1C}">
+                <a14:useLocalDpi xmlns:a14="http://schemas.microsoft.com/office/drawing/2010/main" val="0"/>
+              </a:ext>
+            </a:extLst>
+          </a:blip>
+          <a:srcRect/>
+          <a:stretch>
+            <a:fillRect/>
+          </a:stretch>
+        </p:blipFill>
+        <p:spPr bwMode="auto">
+          <a:xfrm>
+            <a:off x="4067175" y="1057275"/>
+            <a:ext cx="5838825" cy="5800725"/>
+          </a:xfrm>
+          <a:prstGeom prst="rect">
+            <a:avLst/>
+          </a:prstGeom>
+          <a:noFill/>
+          <a:ln>
+            <a:noFill/>
+          </a:ln>
+          <a:extLst>
+            <a:ext uri="{909E8E84-426E-40DD-AFC4-6F175D3DCCD1}">
+              <a14:hiddenFill xmlns:a14="http://schemas.microsoft.com/office/drawing/2010/main">
+                <a:solidFill>
+                  <a:schemeClr val="accent1"/>
+                </a:solidFill>
+              </a14:hiddenFill>
+            </a:ext>
+            <a:ext uri="{91240B29-F687-4F45-9708-019B960494DF}">
+              <a14:hiddenLine xmlns:a14="http://schemas.microsoft.com/office/drawing/2010/main" w="9525">
+                <a:solidFill>
+                  <a:schemeClr val="tx1"/>
+                </a:solidFill>
+                <a:miter lim="800000"/>
+                <a:headEnd/>
+                <a:tailEnd/>
+              </a14:hiddenLine>
+            </a:ext>
+          </a:extLst>
+        </p:spPr>
+      </p:pic>
+      <p:sp>
+        <p:nvSpPr>
+          <p:cNvPr id="22" name="Google Shape;196;p28"/>
+          <p:cNvSpPr txBox="1"/>
+          <p:nvPr/>
+        </p:nvSpPr>
+        <p:spPr>
+          <a:xfrm>
+            <a:off x="0" y="862033"/>
+            <a:ext cx="4213077" cy="1394054"/>
+          </a:xfrm>
+          <a:prstGeom prst="rect">
+            <a:avLst/>
+          </a:prstGeom>
+          <a:noFill/>
+          <a:ln>
+            <a:noFill/>
+          </a:ln>
+        </p:spPr>
+        <p:txBody>
+          <a:bodyPr spcFirstLastPara="1" wrap="square" lIns="91425" tIns="91425" rIns="91425" bIns="91425" anchor="t" anchorCtr="0">
+            <a:noAutofit/>
+          </a:bodyPr>
+          <a:lstStyle/>
+          <a:p>
+            <a:pPr marL="127000" lvl="0" algn="l" rtl="0">
+              <a:spcBef>
+                <a:spcPts val="0"/>
+              </a:spcBef>
+              <a:spcAft>
+                <a:spcPts val="0"/>
+              </a:spcAft>
+              <a:buClr>
+                <a:schemeClr val="dk1"/>
+              </a:buClr>
+              <a:buSzPts val="1600"/>
+            </a:pPr>
+            <a:r>
+              <a:rPr lang="en-US" sz="1600" b="1" dirty="0" smtClean="0">
+                <a:solidFill>
+                  <a:schemeClr val="dk1"/>
+                </a:solidFill>
+                <a:latin typeface="Calibri"/>
+                <a:ea typeface="Calibri"/>
+                <a:cs typeface="Calibri"/>
+                <a:sym typeface="Calibri"/>
+              </a:rPr>
+              <a:t>BMR: Big Mountain Resort</a:t>
+            </a:r>
+          </a:p>
+          <a:p>
+            <a:pPr marL="127000" lvl="0" algn="l" rtl="0">
+              <a:spcBef>
+                <a:spcPts val="0"/>
+              </a:spcBef>
+              <a:spcAft>
+                <a:spcPts val="0"/>
+              </a:spcAft>
+              <a:buClr>
+                <a:schemeClr val="dk1"/>
+              </a:buClr>
+              <a:buSzPts val="1600"/>
+            </a:pPr>
+            <a:r>
+              <a:rPr lang="en-US" sz="1600" b="1" dirty="0" smtClean="0">
+                <a:solidFill>
+                  <a:schemeClr val="dk1"/>
+                </a:solidFill>
+                <a:latin typeface="Calibri"/>
+                <a:ea typeface="Calibri"/>
+                <a:cs typeface="Calibri"/>
+                <a:sym typeface="Calibri"/>
+              </a:rPr>
+              <a:t>LRM: Linear Regression Model</a:t>
+            </a:r>
+          </a:p>
+          <a:p>
+            <a:pPr marL="127000" lvl="0" algn="l" rtl="0">
+              <a:spcBef>
+                <a:spcPts val="0"/>
+              </a:spcBef>
+              <a:spcAft>
+                <a:spcPts val="0"/>
+              </a:spcAft>
+              <a:buClr>
+                <a:schemeClr val="dk1"/>
+              </a:buClr>
+              <a:buSzPts val="1600"/>
+            </a:pPr>
+            <a:r>
+              <a:rPr lang="en-US" sz="1600" b="1" dirty="0" smtClean="0">
+                <a:solidFill>
+                  <a:schemeClr val="dk1"/>
+                </a:solidFill>
+                <a:latin typeface="Calibri"/>
+                <a:ea typeface="Calibri"/>
+                <a:cs typeface="Calibri"/>
+                <a:sym typeface="Calibri"/>
+              </a:rPr>
+              <a:t>RF Model: Random Forest Regression Model</a:t>
+            </a:r>
+          </a:p>
+          <a:p>
+            <a:pPr marL="127000" lvl="0">
+              <a:buClr>
+                <a:schemeClr val="dk1"/>
+              </a:buClr>
+              <a:buSzPts val="1600"/>
+            </a:pPr>
+            <a:r>
+              <a:rPr lang="en-US" sz="1600" b="1" dirty="0" smtClean="0">
+                <a:solidFill>
+                  <a:schemeClr val="dk1"/>
+                </a:solidFill>
+                <a:latin typeface="Calibri"/>
+                <a:ea typeface="Calibri"/>
+                <a:cs typeface="Calibri"/>
+              </a:rPr>
+              <a:t>MAE: Mean Absolute Error</a:t>
+            </a:r>
+          </a:p>
+          <a:p>
+            <a:pPr marL="127000" lvl="0">
+              <a:buClr>
+                <a:schemeClr val="dk1"/>
+              </a:buClr>
+              <a:buSzPts val="1600"/>
+            </a:pPr>
+            <a:r>
+              <a:rPr lang="en-US" sz="1600" b="1" dirty="0" err="1" smtClean="0">
+                <a:solidFill>
+                  <a:schemeClr val="dk1"/>
+                </a:solidFill>
+                <a:latin typeface="Calibri"/>
+                <a:ea typeface="Calibri"/>
+                <a:cs typeface="Calibri"/>
+                <a:sym typeface="Calibri"/>
+              </a:rPr>
+              <a:t>Std</a:t>
+            </a:r>
+            <a:r>
+              <a:rPr lang="en-US" sz="1600" b="1" dirty="0" smtClean="0">
+                <a:solidFill>
+                  <a:schemeClr val="dk1"/>
+                </a:solidFill>
+                <a:latin typeface="Calibri"/>
+                <a:ea typeface="Calibri"/>
+                <a:cs typeface="Calibri"/>
+                <a:sym typeface="Calibri"/>
+              </a:rPr>
+              <a:t>: Standard deviation</a:t>
+            </a:r>
+          </a:p>
+        </p:txBody>
+      </p:sp>
+      <p:sp>
+        <p:nvSpPr>
+          <p:cNvPr id="3" name="Rectangle 2"/>
+          <p:cNvSpPr/>
+          <p:nvPr/>
+        </p:nvSpPr>
+        <p:spPr>
+          <a:xfrm>
+            <a:off x="3973499" y="873757"/>
+            <a:ext cx="941283" cy="307777"/>
+          </a:xfrm>
+          <a:prstGeom prst="rect">
+            <a:avLst/>
+          </a:prstGeom>
+        </p:spPr>
+        <p:txBody>
+          <a:bodyPr wrap="none">
+            <a:spAutoFit/>
+          </a:bodyPr>
+          <a:lstStyle/>
+          <a:p>
+            <a:pPr marL="127000" lvl="0">
+              <a:buClr>
+                <a:schemeClr val="dk1"/>
+              </a:buClr>
+              <a:buSzPts val="1600"/>
+            </a:pPr>
+            <a:r>
+              <a:rPr lang="en-US" b="1" dirty="0" err="1">
+                <a:solidFill>
+                  <a:schemeClr val="dk1"/>
+                </a:solidFill>
+                <a:latin typeface="Calibri"/>
+                <a:ea typeface="Calibri"/>
+                <a:cs typeface="Calibri"/>
+                <a:sym typeface="Calibri"/>
+              </a:rPr>
+              <a:t>s</a:t>
+            </a:r>
+            <a:r>
+              <a:rPr lang="en-US" b="1" dirty="0" err="1" smtClean="0">
+                <a:solidFill>
+                  <a:schemeClr val="dk1"/>
+                </a:solidFill>
+                <a:latin typeface="Calibri"/>
+                <a:ea typeface="Calibri"/>
+                <a:cs typeface="Calibri"/>
+                <a:sym typeface="Calibri"/>
+              </a:rPr>
+              <a:t>ki_data</a:t>
+            </a:r>
+            <a:endParaRPr lang="en-US" b="1" dirty="0">
+              <a:solidFill>
+                <a:schemeClr val="dk1"/>
+              </a:solidFill>
+              <a:latin typeface="Calibri"/>
+              <a:ea typeface="Calibri"/>
+              <a:cs typeface="Calibri"/>
+              <a:sym typeface="Calibri"/>
+            </a:endParaRPr>
+          </a:p>
+        </p:txBody>
+      </p:sp>
+    </p:spTree>
+    <p:extLst>
+      <p:ext uri="{BB962C8B-B14F-4D97-AF65-F5344CB8AC3E}">
+        <p14:creationId xmlns:p14="http://schemas.microsoft.com/office/powerpoint/2010/main" val="1864256378"/>
+      </p:ext>
+    </p:extLst>
+  </p:cSld>
+  <p:clrMapOvr>
+    <a:masterClrMapping/>
+  </p:clrMapOvr>
+</p:sld>
+</file>
+
+<file path=ppt/slides/slide5.xml><?xml version="1.0" encoding="utf-8"?>
+<p:sld xmlns:a="http://schemas.openxmlformats.org/drawingml/2006/main" xmlns:r="http://schemas.openxmlformats.org/officeDocument/2006/relationships" xmlns:p="http://schemas.openxmlformats.org/presentationml/2006/main">
+  <p:cSld>
+    <p:spTree>
+      <p:nvGrpSpPr>
+        <p:cNvPr id="1" name="Shape 183"/>
+        <p:cNvGrpSpPr/>
+        <p:nvPr/>
+      </p:nvGrpSpPr>
+      <p:grpSpPr>
+        <a:xfrm>
+          <a:off x="0" y="0"/>
+          <a:ext cx="0" cy="0"/>
+          <a:chOff x="0" y="0"/>
+          <a:chExt cx="0" cy="0"/>
+        </a:xfrm>
+      </p:grpSpPr>
+      <p:pic>
+        <p:nvPicPr>
+          <p:cNvPr id="185" name="Google Shape;185;p27" descr="springboard-logo-secondary-RGB.png"/>
+          <p:cNvPicPr preferRelativeResize="0"/>
+          <p:nvPr/>
+        </p:nvPicPr>
+        <p:blipFill rotWithShape="1">
+          <a:blip r:embed="rId3">
+            <a:alphaModFix/>
+          </a:blip>
+          <a:srcRect/>
+          <a:stretch/>
+        </p:blipFill>
+        <p:spPr>
+          <a:xfrm>
+            <a:off x="0" y="6055089"/>
+            <a:ext cx="1485900" cy="914400"/>
+          </a:xfrm>
+          <a:prstGeom prst="rect">
+            <a:avLst/>
+          </a:prstGeom>
+          <a:noFill/>
+          <a:ln>
+            <a:noFill/>
+          </a:ln>
+        </p:spPr>
+      </p:pic>
+      <p:sp>
+        <p:nvSpPr>
+          <p:cNvPr id="186" name="Google Shape;186;p27"/>
+          <p:cNvSpPr txBox="1"/>
+          <p:nvPr/>
+        </p:nvSpPr>
+        <p:spPr>
+          <a:xfrm>
+            <a:off x="0" y="7633"/>
+            <a:ext cx="9918350" cy="854400"/>
+          </a:xfrm>
+          <a:prstGeom prst="rect">
+            <a:avLst/>
+          </a:prstGeom>
+          <a:solidFill>
+            <a:srgbClr val="0B5394"/>
+          </a:solidFill>
+          <a:ln>
+            <a:noFill/>
+          </a:ln>
+        </p:spPr>
+        <p:txBody>
+          <a:bodyPr spcFirstLastPara="1" wrap="square" lIns="91425" tIns="91425" rIns="91425" bIns="91425" anchor="t" anchorCtr="0">
+            <a:noAutofit/>
+          </a:bodyPr>
+          <a:lstStyle/>
+          <a:p>
+            <a:pPr lvl="0" algn="ctr"/>
+            <a:r>
+              <a:rPr lang="en-US" sz="2200" dirty="0">
+                <a:solidFill>
+                  <a:schemeClr val="accent5"/>
+                </a:solidFill>
+                <a:latin typeface="Calibri"/>
+                <a:ea typeface="Calibri"/>
+                <a:cs typeface="Calibri"/>
+                <a:sym typeface="Calibri"/>
+              </a:rPr>
+              <a:t>Project</a:t>
+            </a:r>
+            <a:r>
+              <a:rPr lang="en-US" sz="3000" dirty="0">
+                <a:solidFill>
+                  <a:srgbClr val="FFFFFF"/>
+                </a:solidFill>
+                <a:latin typeface="Calibri"/>
+                <a:ea typeface="Calibri"/>
+                <a:cs typeface="Calibri"/>
+                <a:sym typeface="Calibri"/>
+              </a:rPr>
+              <a:t> </a:t>
+            </a:r>
+            <a:r>
+              <a:rPr lang="en-US" sz="2800" b="1" dirty="0" smtClean="0">
+                <a:solidFill>
+                  <a:srgbClr val="F3F3F3"/>
+                </a:solidFill>
+                <a:latin typeface="Roboto"/>
+                <a:ea typeface="Roboto"/>
+                <a:cs typeface="Roboto"/>
+                <a:sym typeface="Roboto"/>
+              </a:rPr>
+              <a:t>Big Mountain Resort Ticket Price</a:t>
+            </a:r>
+          </a:p>
+          <a:p>
+            <a:pPr lvl="0" algn="ctr"/>
+            <a:r>
+              <a:rPr lang="en-US" sz="2000" b="1" dirty="0" smtClean="0">
+                <a:solidFill>
+                  <a:schemeClr val="tx2">
+                    <a:lumMod val="60000"/>
+                    <a:lumOff val="40000"/>
+                  </a:schemeClr>
+                </a:solidFill>
+                <a:latin typeface="Roboto"/>
+                <a:ea typeface="Calibri"/>
+                <a:cs typeface="Calibri"/>
+                <a:sym typeface="Roboto"/>
+              </a:rPr>
+              <a:t>Findings &amp; </a:t>
+            </a:r>
+            <a:r>
+              <a:rPr lang="en-US" sz="2000" b="1" dirty="0">
+                <a:solidFill>
+                  <a:schemeClr val="tx2">
+                    <a:lumMod val="60000"/>
+                    <a:lumOff val="40000"/>
+                  </a:schemeClr>
+                </a:solidFill>
+                <a:latin typeface="Roboto"/>
+                <a:ea typeface="Calibri"/>
+                <a:cs typeface="Calibri"/>
+                <a:sym typeface="Roboto"/>
+              </a:rPr>
+              <a:t>Recommendations </a:t>
+            </a:r>
+            <a:endParaRPr sz="2000" dirty="0">
+              <a:solidFill>
+                <a:schemeClr val="tx2">
+                  <a:lumMod val="60000"/>
+                  <a:lumOff val="40000"/>
+                </a:schemeClr>
+              </a:solidFill>
+              <a:latin typeface="Calibri"/>
+              <a:ea typeface="Calibri"/>
+              <a:cs typeface="Calibri"/>
+              <a:sym typeface="Calibri"/>
+            </a:endParaRPr>
+          </a:p>
+        </p:txBody>
+      </p:sp>
+      <p:sp>
+        <p:nvSpPr>
+          <p:cNvPr id="189" name="Google Shape;189;p27"/>
+          <p:cNvSpPr txBox="1">
+            <a:spLocks noGrp="1"/>
+          </p:cNvSpPr>
+          <p:nvPr>
+            <p:ph type="sldNum" idx="12"/>
+          </p:nvPr>
+        </p:nvSpPr>
+        <p:spPr>
+          <a:xfrm>
+            <a:off x="7099300" y="6356352"/>
+            <a:ext cx="2311400" cy="365200"/>
+          </a:xfrm>
+          <a:prstGeom prst="rect">
+            <a:avLst/>
+          </a:prstGeom>
+        </p:spPr>
+        <p:txBody>
+          <a:bodyPr spcFirstLastPara="1" wrap="square" lIns="68575" tIns="34275" rIns="68575" bIns="34275" anchor="ctr" anchorCtr="0">
+            <a:noAutofit/>
+          </a:bodyPr>
+          <a:lstStyle/>
+          <a:p>
+            <a:pPr marL="0" lvl="0" indent="0" algn="r" rtl="0">
+              <a:spcBef>
+                <a:spcPts val="0"/>
+              </a:spcBef>
+              <a:spcAft>
+                <a:spcPts val="0"/>
+              </a:spcAft>
+              <a:buClr>
+                <a:srgbClr val="000000"/>
+              </a:buClr>
+              <a:buFont typeface="Arial"/>
+              <a:buNone/>
+            </a:pPr>
+            <a:fld id="{00000000-1234-1234-1234-123412341234}" type="slidenum">
+              <a:rPr lang="en-US" smtClean="0"/>
+              <a:t>5</a:t>
             </a:fld>
             <a:endParaRPr dirty="0"/>
           </a:p>
@@ -10580,10 +12177,10 @@
           </a:bodyPr>
           <a:lstStyle/>
           <a:p>
-            <a:pPr marL="457200" indent="-330200">
+            <a:pPr marL="469900" indent="-342900">
               <a:buSzPts val="1600"/>
-              <a:buFont typeface="Calibri"/>
-              <a:buAutoNum type="arabicPeriod"/>
+              <a:buFont typeface="+mj-lt"/>
+              <a:buAutoNum type="arabicPeriod" startAt="3"/>
             </a:pPr>
             <a:r>
               <a:rPr lang="en-US" sz="1600" b="1" dirty="0" smtClean="0">
@@ -10629,10 +12226,10 @@
             </a:endParaRPr>
           </a:p>
           <a:p>
-            <a:pPr marL="457200" indent="-330200">
+            <a:pPr marL="469900" indent="-342900">
               <a:buSzPts val="1600"/>
-              <a:buFont typeface="Calibri"/>
-              <a:buAutoNum type="arabicPeriod"/>
+              <a:buFont typeface="+mj-lt"/>
+              <a:buAutoNum type="arabicPeriod" startAt="3"/>
             </a:pPr>
             <a:r>
               <a:rPr lang="en-US" sz="1600" b="1" dirty="0" smtClean="0">
@@ -10796,7 +12393,7 @@
 </p:sld>
 </file>
 
-<file path=ppt/slides/slide5.xml><?xml version="1.0" encoding="utf-8"?>
+<file path=ppt/slides/slide6.xml><?xml version="1.0" encoding="utf-8"?>
 <p:sld xmlns:a="http://schemas.openxmlformats.org/drawingml/2006/main" xmlns:r="http://schemas.openxmlformats.org/officeDocument/2006/relationships" xmlns:p="http://schemas.openxmlformats.org/presentationml/2006/main">
   <p:cSld>
     <p:spTree>
@@ -11221,7 +12818,7 @@
             </a:pPr>
             <a:fld id="{00000000-1234-1234-1234-123412341234}" type="slidenum">
               <a:rPr lang="en-US"/>
-              <a:t>5</a:t>
+              <a:t>6</a:t>
             </a:fld>
             <a:endParaRPr/>
           </a:p>
@@ -11521,7 +13118,7 @@
                 <a:cs typeface="Calibri"/>
                 <a:sym typeface="Roboto"/>
               </a:rPr>
-              <a:t>Parmas</a:t>
+              <a:t>Params</a:t>
             </a:r>
             <a:r>
               <a:rPr lang="en-US" sz="2000" b="1" dirty="0" smtClean="0">
@@ -11817,7 +13414,7 @@
 </p:sld>
 </file>
 
-<file path=ppt/slides/slide6.xml><?xml version="1.0" encoding="utf-8"?>
+<file path=ppt/slides/slide7.xml><?xml version="1.0" encoding="utf-8"?>
 <p:sld xmlns:a="http://schemas.openxmlformats.org/drawingml/2006/main" xmlns:r="http://schemas.openxmlformats.org/officeDocument/2006/relationships" xmlns:p="http://schemas.openxmlformats.org/presentationml/2006/main">
   <p:cSld>
     <p:spTree>
@@ -12006,18 +13603,7 @@
                 <a:ea typeface="Calibri"/>
                 <a:cs typeface="Calibri"/>
               </a:rPr>
-              <a:t>terraince</a:t>
-            </a:r>
-            <a:r>
-              <a:rPr lang="en-US" sz="1600" dirty="0" err="1" smtClean="0">
-                <a:solidFill>
-                  <a:schemeClr val="dk1"/>
-                </a:solidFill>
-                <a:latin typeface="Calibri"/>
-                <a:ea typeface="Calibri"/>
-                <a:cs typeface="Calibri"/>
-              </a:rPr>
-              <a:t>_area</a:t>
+              <a:t>terraince_area</a:t>
             </a:r>
             <a:r>
               <a:rPr lang="en-US" sz="1600" dirty="0" smtClean="0">
@@ -12115,7 +13701,7 @@
             </a:pPr>
             <a:fld id="{00000000-1234-1234-1234-123412341234}" type="slidenum">
               <a:rPr lang="en-US"/>
-              <a:t>6</a:t>
+              <a:t>7</a:t>
             </a:fld>
             <a:endParaRPr/>
           </a:p>
@@ -12231,22 +13817,7 @@
                 <a:cs typeface="Calibri"/>
                 <a:sym typeface="Roboto"/>
               </a:rPr>
-              <a:t> in </a:t>
-            </a:r>
-            <a:r>
-              <a:rPr lang="en-US" sz="2000" b="1" dirty="0" smtClean="0">
-                <a:solidFill>
-                  <a:schemeClr val="tx2">
-                    <a:lumMod val="60000"/>
-                    <a:lumOff val="40000"/>
-                  </a:schemeClr>
-                </a:solidFill>
-                <a:latin typeface="Roboto"/>
-                <a:ea typeface="Calibri"/>
-                <a:cs typeface="Calibri"/>
-                <a:sym typeface="Roboto"/>
-              </a:rPr>
-              <a:t>Market Context</a:t>
+              <a:t> in Market Context</a:t>
             </a:r>
             <a:endParaRPr sz="2000" dirty="0">
               <a:solidFill>
@@ -12708,7 +14279,7 @@
 </p:sld>
 </file>
 
-<file path=ppt/slides/slide7.xml><?xml version="1.0" encoding="utf-8"?>
+<file path=ppt/slides/slide8.xml><?xml version="1.0" encoding="utf-8"?>
 <p:sld xmlns:a="http://schemas.openxmlformats.org/drawingml/2006/main" xmlns:r="http://schemas.openxmlformats.org/officeDocument/2006/relationships" xmlns:p="http://schemas.openxmlformats.org/presentationml/2006/main">
   <p:cSld>
     <p:spTree>
@@ -12900,7 +14471,7 @@
             </a:pPr>
             <a:fld id="{00000000-1234-1234-1234-123412341234}" type="slidenum">
               <a:rPr lang="en-US"/>
-              <a:t>7</a:t>
+              <a:t>8</a:t>
             </a:fld>
             <a:endParaRPr/>
           </a:p>
@@ -13068,18 +14639,7 @@
                 <a:ea typeface="Calibri"/>
                 <a:cs typeface="Calibri"/>
               </a:rPr>
-              <a:t>F</a:t>
-            </a:r>
-            <a:r>
-              <a:rPr lang="en-US" sz="1600" b="1" dirty="0" smtClean="0">
-                <a:solidFill>
-                  <a:schemeClr val="dk1"/>
-                </a:solidFill>
-                <a:latin typeface="Calibri"/>
-                <a:ea typeface="Calibri"/>
-                <a:cs typeface="Calibri"/>
-              </a:rPr>
-              <a:t>eatures</a:t>
+              <a:t>Features</a:t>
             </a:r>
             <a:r>
               <a:rPr lang="en-US" sz="1600" dirty="0" smtClean="0">
@@ -13090,7 +14650,18 @@
                 <a:ea typeface="Calibri"/>
                 <a:cs typeface="Calibri"/>
               </a:rPr>
-              <a:t> (</a:t>
+              <a:t> (Runs, </a:t>
+            </a:r>
+            <a:r>
+              <a:rPr lang="en-US" sz="1600" dirty="0" err="1">
+                <a:solidFill>
+                  <a:schemeClr val="dk1"/>
+                </a:solidFill>
+                <a:latin typeface="Calibri"/>
+                <a:ea typeface="Calibri"/>
+                <a:cs typeface="Calibri"/>
+              </a:rPr>
+              <a:t>vertical_drop</a:t>
             </a:r>
             <a:r>
               <a:rPr lang="en-US" sz="1600" dirty="0" smtClean="0">
@@ -13101,7 +14672,7 @@
                 <a:ea typeface="Calibri"/>
                 <a:cs typeface="Calibri"/>
               </a:rPr>
-              <a:t>Runs, </a:t>
+              <a:t>, Snow </a:t>
             </a:r>
             <a:r>
               <a:rPr lang="en-US" sz="1600" dirty="0" err="1">
@@ -13112,7 +14683,29 @@
                 <a:ea typeface="Calibri"/>
                 <a:cs typeface="Calibri"/>
               </a:rPr>
-              <a:t>vertical_drop</a:t>
+              <a:t>Making_ac</a:t>
+            </a:r>
+            <a:r>
+              <a:rPr lang="en-US" sz="1600" dirty="0">
+                <a:solidFill>
+                  <a:schemeClr val="dk1"/>
+                </a:solidFill>
+                <a:latin typeface="Calibri"/>
+                <a:ea typeface="Calibri"/>
+                <a:cs typeface="Calibri"/>
+              </a:rPr>
+              <a:t>, </a:t>
+            </a:r>
+            <a:r>
+              <a:rPr lang="en-US" sz="1600" dirty="0" err="1" smtClean="0">
+                <a:solidFill>
+                  <a:schemeClr val="dk1"/>
+                </a:solidFill>
+                <a:latin typeface="Calibri"/>
+                <a:ea typeface="Calibri"/>
+                <a:cs typeface="Calibri"/>
+              </a:rPr>
+              <a:t>total_chairs</a:t>
             </a:r>
             <a:r>
               <a:rPr lang="en-US" sz="1600" dirty="0" smtClean="0">
@@ -13123,41 +14716,11 @@
                 <a:ea typeface="Calibri"/>
                 <a:cs typeface="Calibri"/>
               </a:rPr>
-              <a:t>, Snow </a:t>
-            </a:r>
-            <a:r>
-              <a:rPr lang="en-US" sz="1600" dirty="0" err="1">
-                <a:solidFill>
-                  <a:schemeClr val="dk1"/>
-                </a:solidFill>
-                <a:latin typeface="Calibri"/>
-                <a:ea typeface="Calibri"/>
-                <a:cs typeface="Calibri"/>
-              </a:rPr>
-              <a:t>Making_ac</a:t>
-            </a:r>
-            <a:r>
-              <a:rPr lang="en-US" sz="1600" dirty="0">
-                <a:solidFill>
-                  <a:schemeClr val="dk1"/>
-                </a:solidFill>
-                <a:latin typeface="Calibri"/>
-                <a:ea typeface="Calibri"/>
-                <a:cs typeface="Calibri"/>
-              </a:rPr>
-              <a:t>, </a:t>
-            </a:r>
-            <a:r>
-              <a:rPr lang="en-US" sz="1600" dirty="0" err="1" smtClean="0">
-                <a:solidFill>
-                  <a:schemeClr val="dk1"/>
-                </a:solidFill>
-                <a:latin typeface="Calibri"/>
-                <a:ea typeface="Calibri"/>
-                <a:cs typeface="Calibri"/>
-              </a:rPr>
-              <a:t>total_chairs</a:t>
-            </a:r>
+              <a:t>) show significant changes in ticket price &amp; revenue</a:t>
+            </a:r>
+          </a:p>
+          <a:p>
+            <a:pPr lvl="0"/>
             <a:r>
               <a:rPr lang="en-US" sz="1600" dirty="0" smtClean="0">
                 <a:solidFill>
@@ -13166,8 +14729,9 @@
                 <a:latin typeface="Calibri"/>
                 <a:ea typeface="Calibri"/>
                 <a:cs typeface="Calibri"/>
-              </a:rPr>
-              <a:t>) show significant changes in ticket price &amp; revenue</a:t>
+                <a:sym typeface="Calibri"/>
+              </a:rPr>
+              <a:t>Revenue &amp; price are positive correlation</a:t>
             </a:r>
             <a:endParaRPr sz="1600" dirty="0">
               <a:solidFill>
@@ -13401,917 +14965,6 @@
     <p:extLst>
       <p:ext uri="{BB962C8B-B14F-4D97-AF65-F5344CB8AC3E}">
         <p14:creationId xmlns:p14="http://schemas.microsoft.com/office/powerpoint/2010/main" val="1295612640"/>
-      </p:ext>
-    </p:extLst>
-  </p:cSld>
-  <p:clrMapOvr>
-    <a:masterClrMapping/>
-  </p:clrMapOvr>
-</p:sld>
-</file>
-
-<file path=ppt/slides/slide8.xml><?xml version="1.0" encoding="utf-8"?>
-<p:sld xmlns:a="http://schemas.openxmlformats.org/drawingml/2006/main" xmlns:r="http://schemas.openxmlformats.org/officeDocument/2006/relationships" xmlns:p="http://schemas.openxmlformats.org/presentationml/2006/main">
-  <p:cSld>
-    <p:spTree>
-      <p:nvGrpSpPr>
-        <p:cNvPr id="1" name="Shape 193"/>
-        <p:cNvGrpSpPr/>
-        <p:nvPr/>
-      </p:nvGrpSpPr>
-      <p:grpSpPr>
-        <a:xfrm>
-          <a:off x="0" y="0"/>
-          <a:ext cx="0" cy="0"/>
-          <a:chOff x="0" y="0"/>
-          <a:chExt cx="0" cy="0"/>
-        </a:xfrm>
-      </p:grpSpPr>
-      <p:pic>
-        <p:nvPicPr>
-          <p:cNvPr id="194" name="Google Shape;194;p28" descr="springboard-logo-secondary-RGB.png"/>
-          <p:cNvPicPr preferRelativeResize="0"/>
-          <p:nvPr/>
-        </p:nvPicPr>
-        <p:blipFill rotWithShape="1">
-          <a:blip r:embed="rId3">
-            <a:alphaModFix/>
-          </a:blip>
-          <a:srcRect/>
-          <a:stretch/>
-        </p:blipFill>
-        <p:spPr>
-          <a:xfrm>
-            <a:off x="0" y="6055089"/>
-            <a:ext cx="1485900" cy="914400"/>
-          </a:xfrm>
-          <a:prstGeom prst="rect">
-            <a:avLst/>
-          </a:prstGeom>
-          <a:noFill/>
-          <a:ln>
-            <a:noFill/>
-          </a:ln>
-        </p:spPr>
-      </p:pic>
-      <p:sp>
-        <p:nvSpPr>
-          <p:cNvPr id="204" name="Google Shape;204;p28"/>
-          <p:cNvSpPr txBox="1">
-            <a:spLocks noGrp="1"/>
-          </p:cNvSpPr>
-          <p:nvPr>
-            <p:ph type="sldNum" idx="12"/>
-          </p:nvPr>
-        </p:nvSpPr>
-        <p:spPr>
-          <a:xfrm>
-            <a:off x="7099300" y="6356352"/>
-            <a:ext cx="2311400" cy="365200"/>
-          </a:xfrm>
-          <a:prstGeom prst="rect">
-            <a:avLst/>
-          </a:prstGeom>
-        </p:spPr>
-        <p:txBody>
-          <a:bodyPr spcFirstLastPara="1" wrap="square" lIns="68575" tIns="34275" rIns="68575" bIns="34275" anchor="ctr" anchorCtr="0">
-            <a:noAutofit/>
-          </a:bodyPr>
-          <a:lstStyle/>
-          <a:p>
-            <a:pPr marL="0" lvl="0" indent="0" algn="r" rtl="0">
-              <a:spcBef>
-                <a:spcPts val="0"/>
-              </a:spcBef>
-              <a:spcAft>
-                <a:spcPts val="0"/>
-              </a:spcAft>
-              <a:buClr>
-                <a:srgbClr val="000000"/>
-              </a:buClr>
-              <a:buFont typeface="Arial"/>
-              <a:buNone/>
-            </a:pPr>
-            <a:fld id="{00000000-1234-1234-1234-123412341234}" type="slidenum">
-              <a:rPr lang="en-US"/>
-              <a:t>8</a:t>
-            </a:fld>
-            <a:endParaRPr/>
-          </a:p>
-        </p:txBody>
-      </p:sp>
-      <p:sp>
-        <p:nvSpPr>
-          <p:cNvPr id="10" name="Google Shape;186;p27"/>
-          <p:cNvSpPr txBox="1"/>
-          <p:nvPr/>
-        </p:nvSpPr>
-        <p:spPr>
-          <a:xfrm>
-            <a:off x="0" y="7633"/>
-            <a:ext cx="9918350" cy="854400"/>
-          </a:xfrm>
-          <a:prstGeom prst="rect">
-            <a:avLst/>
-          </a:prstGeom>
-          <a:solidFill>
-            <a:srgbClr val="0B5394"/>
-          </a:solidFill>
-          <a:ln>
-            <a:noFill/>
-          </a:ln>
-        </p:spPr>
-        <p:txBody>
-          <a:bodyPr spcFirstLastPara="1" wrap="square" lIns="91425" tIns="91425" rIns="91425" bIns="91425" anchor="t" anchorCtr="0">
-            <a:noAutofit/>
-          </a:bodyPr>
-          <a:lstStyle/>
-          <a:p>
-            <a:pPr lvl="0" algn="ctr"/>
-            <a:r>
-              <a:rPr lang="en-US" sz="2200" dirty="0">
-                <a:solidFill>
-                  <a:schemeClr val="accent5"/>
-                </a:solidFill>
-                <a:latin typeface="Calibri"/>
-                <a:ea typeface="Calibri"/>
-                <a:cs typeface="Calibri"/>
-                <a:sym typeface="Calibri"/>
-              </a:rPr>
-              <a:t>Project</a:t>
-            </a:r>
-            <a:r>
-              <a:rPr lang="en-US" sz="3000" dirty="0">
-                <a:solidFill>
-                  <a:srgbClr val="FFFFFF"/>
-                </a:solidFill>
-                <a:latin typeface="Calibri"/>
-                <a:ea typeface="Calibri"/>
-                <a:cs typeface="Calibri"/>
-                <a:sym typeface="Calibri"/>
-              </a:rPr>
-              <a:t> </a:t>
-            </a:r>
-            <a:r>
-              <a:rPr lang="en-US" sz="2800" b="1" dirty="0" smtClean="0">
-                <a:solidFill>
-                  <a:srgbClr val="F3F3F3"/>
-                </a:solidFill>
-                <a:latin typeface="Roboto"/>
-                <a:ea typeface="Roboto"/>
-                <a:cs typeface="Roboto"/>
-                <a:sym typeface="Roboto"/>
-              </a:rPr>
-              <a:t>Big Mountain Resort Ticket Price</a:t>
-            </a:r>
-          </a:p>
-          <a:p>
-            <a:pPr lvl="0" algn="ctr"/>
-            <a:r>
-              <a:rPr lang="en-US" sz="2000" b="1" dirty="0" smtClean="0">
-                <a:solidFill>
-                  <a:schemeClr val="tx2">
-                    <a:lumMod val="60000"/>
-                    <a:lumOff val="40000"/>
-                  </a:schemeClr>
-                </a:solidFill>
-                <a:latin typeface="Roboto"/>
-                <a:ea typeface="Calibri"/>
-                <a:cs typeface="Calibri"/>
-                <a:sym typeface="Roboto"/>
-              </a:rPr>
-              <a:t>Model </a:t>
-            </a:r>
-            <a:r>
-              <a:rPr lang="en-US" sz="2000" b="1" dirty="0" err="1" smtClean="0">
-                <a:solidFill>
-                  <a:schemeClr val="tx2">
-                    <a:lumMod val="60000"/>
-                    <a:lumOff val="40000"/>
-                  </a:schemeClr>
-                </a:solidFill>
-                <a:latin typeface="Roboto"/>
-                <a:ea typeface="Calibri"/>
-                <a:cs typeface="Calibri"/>
-                <a:sym typeface="Roboto"/>
-              </a:rPr>
-              <a:t>Params</a:t>
-            </a:r>
-            <a:r>
-              <a:rPr lang="en-US" sz="2000" b="1" dirty="0" smtClean="0">
-                <a:solidFill>
-                  <a:schemeClr val="tx2">
-                    <a:lumMod val="60000"/>
-                    <a:lumOff val="40000"/>
-                  </a:schemeClr>
-                </a:solidFill>
-                <a:latin typeface="Roboto"/>
-                <a:ea typeface="Calibri"/>
-                <a:cs typeface="Calibri"/>
-                <a:sym typeface="Roboto"/>
-              </a:rPr>
-              <a:t> Filtering</a:t>
-            </a:r>
-            <a:endParaRPr sz="2000" dirty="0">
-              <a:solidFill>
-                <a:schemeClr val="tx2">
-                  <a:lumMod val="60000"/>
-                  <a:lumOff val="40000"/>
-                </a:schemeClr>
-              </a:solidFill>
-              <a:latin typeface="Calibri"/>
-              <a:ea typeface="Calibri"/>
-              <a:cs typeface="Calibri"/>
-              <a:sym typeface="Calibri"/>
-            </a:endParaRPr>
-          </a:p>
-        </p:txBody>
-      </p:sp>
-      <p:sp>
-        <p:nvSpPr>
-          <p:cNvPr id="11" name="Google Shape;196;p28"/>
-          <p:cNvSpPr txBox="1"/>
-          <p:nvPr/>
-        </p:nvSpPr>
-        <p:spPr>
-          <a:xfrm>
-            <a:off x="0" y="759485"/>
-            <a:ext cx="9906000" cy="727152"/>
-          </a:xfrm>
-          <a:prstGeom prst="rect">
-            <a:avLst/>
-          </a:prstGeom>
-          <a:noFill/>
-          <a:ln>
-            <a:noFill/>
-          </a:ln>
-        </p:spPr>
-        <p:txBody>
-          <a:bodyPr spcFirstLastPara="1" wrap="square" lIns="91425" tIns="91425" rIns="91425" bIns="91425" anchor="t" anchorCtr="0">
-            <a:noAutofit/>
-          </a:bodyPr>
-          <a:lstStyle/>
-          <a:p>
-            <a:pPr lvl="0"/>
-            <a:r>
-              <a:rPr lang="en-US" sz="1600" b="1" dirty="0" smtClean="0">
-                <a:solidFill>
-                  <a:schemeClr val="dk1"/>
-                </a:solidFill>
-                <a:latin typeface="Calibri"/>
-                <a:ea typeface="Calibri"/>
-                <a:cs typeface="Calibri"/>
-              </a:rPr>
-              <a:t>F</a:t>
-            </a:r>
-            <a:r>
-              <a:rPr lang="en-US" sz="1600" b="1" dirty="0" smtClean="0">
-                <a:solidFill>
-                  <a:schemeClr val="dk1"/>
-                </a:solidFill>
-                <a:latin typeface="Calibri"/>
-                <a:ea typeface="Calibri"/>
-                <a:cs typeface="Calibri"/>
-              </a:rPr>
-              <a:t>eatures </a:t>
-            </a:r>
-            <a:r>
-              <a:rPr lang="en-US" sz="1600" dirty="0" smtClean="0">
-                <a:solidFill>
-                  <a:schemeClr val="dk1"/>
-                </a:solidFill>
-                <a:latin typeface="Calibri"/>
-                <a:ea typeface="Calibri"/>
-                <a:cs typeface="Calibri"/>
-              </a:rPr>
-              <a:t>(</a:t>
-            </a:r>
-            <a:r>
-              <a:rPr lang="en-US" sz="1600" dirty="0" err="1" smtClean="0">
-                <a:solidFill>
-                  <a:schemeClr val="dk1"/>
-                </a:solidFill>
-                <a:latin typeface="Calibri"/>
-                <a:ea typeface="Calibri"/>
-                <a:cs typeface="Calibri"/>
-              </a:rPr>
-              <a:t>total_chairs</a:t>
-            </a:r>
-            <a:r>
-              <a:rPr lang="en-US" sz="1600" dirty="0" smtClean="0">
-                <a:solidFill>
-                  <a:schemeClr val="dk1"/>
-                </a:solidFill>
-                <a:latin typeface="Calibri"/>
-                <a:ea typeface="Calibri"/>
-                <a:cs typeface="Calibri"/>
-              </a:rPr>
-              <a:t>, </a:t>
-            </a:r>
-            <a:r>
-              <a:rPr lang="en-US" sz="1600" dirty="0" err="1" smtClean="0">
-                <a:solidFill>
-                  <a:schemeClr val="dk1"/>
-                </a:solidFill>
-                <a:latin typeface="Calibri"/>
-                <a:ea typeface="Calibri"/>
-                <a:cs typeface="Calibri"/>
-              </a:rPr>
-              <a:t>LongestRun_mi</a:t>
-            </a:r>
-            <a:r>
-              <a:rPr lang="en-US" sz="1600" dirty="0" smtClean="0">
-                <a:solidFill>
-                  <a:schemeClr val="dk1"/>
-                </a:solidFill>
-                <a:latin typeface="Calibri"/>
-                <a:ea typeface="Calibri"/>
-                <a:cs typeface="Calibri"/>
-              </a:rPr>
-              <a:t>, </a:t>
-            </a:r>
-            <a:r>
-              <a:rPr lang="en-US" sz="1600" dirty="0" err="1">
-                <a:solidFill>
-                  <a:schemeClr val="dk1"/>
-                </a:solidFill>
-                <a:latin typeface="Calibri"/>
-                <a:ea typeface="Calibri"/>
-                <a:cs typeface="Calibri"/>
-              </a:rPr>
-              <a:t>fastQuads</a:t>
-            </a:r>
-            <a:r>
-              <a:rPr lang="en-US" sz="1600" dirty="0">
-                <a:solidFill>
-                  <a:schemeClr val="dk1"/>
-                </a:solidFill>
-                <a:latin typeface="Calibri"/>
-                <a:ea typeface="Calibri"/>
-                <a:cs typeface="Calibri"/>
-              </a:rPr>
-              <a:t>, trams</a:t>
-            </a:r>
-            <a:r>
-              <a:rPr lang="en-US" sz="1600" dirty="0">
-                <a:solidFill>
-                  <a:schemeClr val="dk1"/>
-                </a:solidFill>
-                <a:latin typeface="Calibri"/>
-                <a:ea typeface="Calibri"/>
-                <a:cs typeface="Calibri"/>
-              </a:rPr>
-              <a:t>, </a:t>
-            </a:r>
-            <a:r>
-              <a:rPr lang="en-US" sz="1600" dirty="0" err="1" smtClean="0">
-                <a:solidFill>
-                  <a:schemeClr val="dk1"/>
-                </a:solidFill>
-                <a:latin typeface="Calibri"/>
-                <a:ea typeface="Calibri"/>
-                <a:cs typeface="Calibri"/>
-              </a:rPr>
-              <a:t>SkiableTerrain_ac</a:t>
-            </a:r>
-            <a:r>
-              <a:rPr lang="en-US" sz="1600" dirty="0" smtClean="0">
-                <a:solidFill>
-                  <a:schemeClr val="dk1"/>
-                </a:solidFill>
-                <a:latin typeface="Calibri"/>
-                <a:ea typeface="Calibri"/>
-                <a:cs typeface="Calibri"/>
-              </a:rPr>
-              <a:t>) </a:t>
-            </a:r>
-          </a:p>
-          <a:p>
-            <a:pPr lvl="0"/>
-            <a:r>
-              <a:rPr lang="en-US" sz="1600" b="1" dirty="0" err="1" smtClean="0">
-                <a:solidFill>
-                  <a:schemeClr val="dk1"/>
-                </a:solidFill>
-                <a:latin typeface="Calibri"/>
-                <a:ea typeface="Calibri"/>
-                <a:cs typeface="Calibri"/>
-              </a:rPr>
-              <a:t>total_chairs</a:t>
-            </a:r>
-            <a:r>
-              <a:rPr lang="en-US" sz="1600" dirty="0" smtClean="0">
-                <a:solidFill>
-                  <a:schemeClr val="dk1"/>
-                </a:solidFill>
-                <a:latin typeface="Calibri"/>
-                <a:ea typeface="Calibri"/>
-                <a:cs typeface="Calibri"/>
-              </a:rPr>
-              <a:t> feature shows s a significant effect on revenue &amp; price. Whist the rest are not feasible to change </a:t>
-            </a:r>
-            <a:endParaRPr sz="1600" dirty="0">
-              <a:solidFill>
-                <a:schemeClr val="dk1"/>
-              </a:solidFill>
-              <a:latin typeface="Calibri"/>
-              <a:ea typeface="Calibri"/>
-              <a:cs typeface="Calibri"/>
-              <a:sym typeface="Calibri"/>
-            </a:endParaRPr>
-          </a:p>
-        </p:txBody>
-      </p:sp>
-      <p:pic>
-        <p:nvPicPr>
-          <p:cNvPr id="2050" name="Picture 2"/>
-          <p:cNvPicPr>
-            <a:picLocks noChangeAspect="1" noChangeArrowheads="1"/>
-          </p:cNvPicPr>
-          <p:nvPr/>
-        </p:nvPicPr>
-        <p:blipFill>
-          <a:blip r:embed="rId4">
-            <a:extLst>
-              <a:ext uri="{28A0092B-C50C-407E-A947-70E740481C1C}">
-                <a14:useLocalDpi xmlns:a14="http://schemas.microsoft.com/office/drawing/2010/main" val="0"/>
-              </a:ext>
-            </a:extLst>
-          </a:blip>
-          <a:srcRect/>
-          <a:stretch>
-            <a:fillRect/>
-          </a:stretch>
-        </p:blipFill>
-        <p:spPr bwMode="auto">
-          <a:xfrm>
-            <a:off x="3339175" y="1324367"/>
-            <a:ext cx="3240000" cy="1756781"/>
-          </a:xfrm>
-          <a:prstGeom prst="rect">
-            <a:avLst/>
-          </a:prstGeom>
-          <a:noFill/>
-          <a:ln>
-            <a:noFill/>
-          </a:ln>
-          <a:extLst>
-            <a:ext uri="{909E8E84-426E-40DD-AFC4-6F175D3DCCD1}">
-              <a14:hiddenFill xmlns:a14="http://schemas.microsoft.com/office/drawing/2010/main">
-                <a:solidFill>
-                  <a:schemeClr val="accent1"/>
-                </a:solidFill>
-              </a14:hiddenFill>
-            </a:ext>
-            <a:ext uri="{91240B29-F687-4F45-9708-019B960494DF}">
-              <a14:hiddenLine xmlns:a14="http://schemas.microsoft.com/office/drawing/2010/main" w="9525">
-                <a:solidFill>
-                  <a:schemeClr val="tx1"/>
-                </a:solidFill>
-                <a:miter lim="800000"/>
-                <a:headEnd/>
-                <a:tailEnd/>
-              </a14:hiddenLine>
-            </a:ext>
-          </a:extLst>
-        </p:spPr>
-      </p:pic>
-      <p:pic>
-        <p:nvPicPr>
-          <p:cNvPr id="2053" name="Picture 5"/>
-          <p:cNvPicPr>
-            <a:picLocks noChangeAspect="1" noChangeArrowheads="1"/>
-          </p:cNvPicPr>
-          <p:nvPr/>
-        </p:nvPicPr>
-        <p:blipFill>
-          <a:blip r:embed="rId5">
-            <a:extLst>
-              <a:ext uri="{28A0092B-C50C-407E-A947-70E740481C1C}">
-                <a14:useLocalDpi xmlns:a14="http://schemas.microsoft.com/office/drawing/2010/main" val="0"/>
-              </a:ext>
-            </a:extLst>
-          </a:blip>
-          <a:srcRect/>
-          <a:stretch>
-            <a:fillRect/>
-          </a:stretch>
-        </p:blipFill>
-        <p:spPr bwMode="auto">
-          <a:xfrm>
-            <a:off x="22028" y="1336711"/>
-            <a:ext cx="3240000" cy="1733907"/>
-          </a:xfrm>
-          <a:prstGeom prst="rect">
-            <a:avLst/>
-          </a:prstGeom>
-          <a:noFill/>
-          <a:ln>
-            <a:noFill/>
-          </a:ln>
-          <a:extLst>
-            <a:ext uri="{909E8E84-426E-40DD-AFC4-6F175D3DCCD1}">
-              <a14:hiddenFill xmlns:a14="http://schemas.microsoft.com/office/drawing/2010/main">
-                <a:solidFill>
-                  <a:schemeClr val="accent1"/>
-                </a:solidFill>
-              </a14:hiddenFill>
-            </a:ext>
-            <a:ext uri="{91240B29-F687-4F45-9708-019B960494DF}">
-              <a14:hiddenLine xmlns:a14="http://schemas.microsoft.com/office/drawing/2010/main" w="9525">
-                <a:solidFill>
-                  <a:schemeClr val="tx1"/>
-                </a:solidFill>
-                <a:miter lim="800000"/>
-                <a:headEnd/>
-                <a:tailEnd/>
-              </a14:hiddenLine>
-            </a:ext>
-          </a:extLst>
-        </p:spPr>
-      </p:pic>
-      <p:pic>
-        <p:nvPicPr>
-          <p:cNvPr id="2055" name="Picture 7"/>
-          <p:cNvPicPr>
-            <a:picLocks noChangeAspect="1" noChangeArrowheads="1"/>
-          </p:cNvPicPr>
-          <p:nvPr/>
-        </p:nvPicPr>
-        <p:blipFill>
-          <a:blip r:embed="rId6">
-            <a:extLst>
-              <a:ext uri="{28A0092B-C50C-407E-A947-70E740481C1C}">
-                <a14:useLocalDpi xmlns:a14="http://schemas.microsoft.com/office/drawing/2010/main" val="0"/>
-              </a:ext>
-            </a:extLst>
-          </a:blip>
-          <a:srcRect/>
-          <a:stretch>
-            <a:fillRect/>
-          </a:stretch>
-        </p:blipFill>
-        <p:spPr bwMode="auto">
-          <a:xfrm>
-            <a:off x="3283556" y="3226503"/>
-            <a:ext cx="3240000" cy="1716279"/>
-          </a:xfrm>
-          <a:prstGeom prst="rect">
-            <a:avLst/>
-          </a:prstGeom>
-          <a:noFill/>
-          <a:ln>
-            <a:noFill/>
-          </a:ln>
-          <a:extLst>
-            <a:ext uri="{909E8E84-426E-40DD-AFC4-6F175D3DCCD1}">
-              <a14:hiddenFill xmlns:a14="http://schemas.microsoft.com/office/drawing/2010/main">
-                <a:solidFill>
-                  <a:schemeClr val="accent1"/>
-                </a:solidFill>
-              </a14:hiddenFill>
-            </a:ext>
-            <a:ext uri="{91240B29-F687-4F45-9708-019B960494DF}">
-              <a14:hiddenLine xmlns:a14="http://schemas.microsoft.com/office/drawing/2010/main" w="9525">
-                <a:solidFill>
-                  <a:schemeClr val="tx1"/>
-                </a:solidFill>
-                <a:miter lim="800000"/>
-                <a:headEnd/>
-                <a:tailEnd/>
-              </a14:hiddenLine>
-            </a:ext>
-          </a:extLst>
-        </p:spPr>
-      </p:pic>
-      <p:pic>
-        <p:nvPicPr>
-          <p:cNvPr id="2056" name="Picture 8"/>
-          <p:cNvPicPr>
-            <a:picLocks noChangeAspect="1" noChangeArrowheads="1"/>
-          </p:cNvPicPr>
-          <p:nvPr/>
-        </p:nvPicPr>
-        <p:blipFill>
-          <a:blip r:embed="rId7">
-            <a:extLst>
-              <a:ext uri="{28A0092B-C50C-407E-A947-70E740481C1C}">
-                <a14:useLocalDpi xmlns:a14="http://schemas.microsoft.com/office/drawing/2010/main" val="0"/>
-              </a:ext>
-            </a:extLst>
-          </a:blip>
-          <a:srcRect/>
-          <a:stretch>
-            <a:fillRect/>
-          </a:stretch>
-        </p:blipFill>
-        <p:spPr bwMode="auto">
-          <a:xfrm>
-            <a:off x="3339175" y="5090175"/>
-            <a:ext cx="3240000" cy="1764527"/>
-          </a:xfrm>
-          <a:prstGeom prst="rect">
-            <a:avLst/>
-          </a:prstGeom>
-          <a:noFill/>
-          <a:ln>
-            <a:noFill/>
-          </a:ln>
-          <a:extLst>
-            <a:ext uri="{909E8E84-426E-40DD-AFC4-6F175D3DCCD1}">
-              <a14:hiddenFill xmlns:a14="http://schemas.microsoft.com/office/drawing/2010/main">
-                <a:solidFill>
-                  <a:schemeClr val="accent1"/>
-                </a:solidFill>
-              </a14:hiddenFill>
-            </a:ext>
-            <a:ext uri="{91240B29-F687-4F45-9708-019B960494DF}">
-              <a14:hiddenLine xmlns:a14="http://schemas.microsoft.com/office/drawing/2010/main" w="9525">
-                <a:solidFill>
-                  <a:schemeClr val="tx1"/>
-                </a:solidFill>
-                <a:miter lim="800000"/>
-                <a:headEnd/>
-                <a:tailEnd/>
-              </a14:hiddenLine>
-            </a:ext>
-          </a:extLst>
-        </p:spPr>
-      </p:pic>
-      <p:pic>
-        <p:nvPicPr>
-          <p:cNvPr id="2057" name="Picture 9"/>
-          <p:cNvPicPr>
-            <a:picLocks noChangeAspect="1" noChangeArrowheads="1"/>
-          </p:cNvPicPr>
-          <p:nvPr/>
-        </p:nvPicPr>
-        <p:blipFill>
-          <a:blip r:embed="rId8">
-            <a:extLst>
-              <a:ext uri="{28A0092B-C50C-407E-A947-70E740481C1C}">
-                <a14:useLocalDpi xmlns:a14="http://schemas.microsoft.com/office/drawing/2010/main" val="0"/>
-              </a:ext>
-            </a:extLst>
-          </a:blip>
-          <a:srcRect/>
-          <a:stretch>
-            <a:fillRect/>
-          </a:stretch>
-        </p:blipFill>
-        <p:spPr bwMode="auto">
-          <a:xfrm>
-            <a:off x="22028" y="5104651"/>
-            <a:ext cx="3240000" cy="1747225"/>
-          </a:xfrm>
-          <a:prstGeom prst="rect">
-            <a:avLst/>
-          </a:prstGeom>
-          <a:noFill/>
-          <a:ln>
-            <a:noFill/>
-          </a:ln>
-          <a:extLst>
-            <a:ext uri="{909E8E84-426E-40DD-AFC4-6F175D3DCCD1}">
-              <a14:hiddenFill xmlns:a14="http://schemas.microsoft.com/office/drawing/2010/main">
-                <a:solidFill>
-                  <a:schemeClr val="accent1"/>
-                </a:solidFill>
-              </a14:hiddenFill>
-            </a:ext>
-            <a:ext uri="{91240B29-F687-4F45-9708-019B960494DF}">
-              <a14:hiddenLine xmlns:a14="http://schemas.microsoft.com/office/drawing/2010/main" w="9525">
-                <a:solidFill>
-                  <a:schemeClr val="tx1"/>
-                </a:solidFill>
-                <a:miter lim="800000"/>
-                <a:headEnd/>
-                <a:tailEnd/>
-              </a14:hiddenLine>
-            </a:ext>
-          </a:extLst>
-        </p:spPr>
-      </p:pic>
-      <p:pic>
-        <p:nvPicPr>
-          <p:cNvPr id="2058" name="Picture 10"/>
-          <p:cNvPicPr>
-            <a:picLocks noChangeAspect="1" noChangeArrowheads="1"/>
-          </p:cNvPicPr>
-          <p:nvPr/>
-        </p:nvPicPr>
-        <p:blipFill>
-          <a:blip r:embed="rId9">
-            <a:extLst>
-              <a:ext uri="{28A0092B-C50C-407E-A947-70E740481C1C}">
-                <a14:useLocalDpi xmlns:a14="http://schemas.microsoft.com/office/drawing/2010/main" val="0"/>
-              </a:ext>
-            </a:extLst>
-          </a:blip>
-          <a:srcRect/>
-          <a:stretch>
-            <a:fillRect/>
-          </a:stretch>
-        </p:blipFill>
-        <p:spPr bwMode="auto">
-          <a:xfrm>
-            <a:off x="6666000" y="1323035"/>
-            <a:ext cx="3240000" cy="1719529"/>
-          </a:xfrm>
-          <a:prstGeom prst="rect">
-            <a:avLst/>
-          </a:prstGeom>
-          <a:noFill/>
-          <a:ln>
-            <a:noFill/>
-          </a:ln>
-          <a:extLst>
-            <a:ext uri="{909E8E84-426E-40DD-AFC4-6F175D3DCCD1}">
-              <a14:hiddenFill xmlns:a14="http://schemas.microsoft.com/office/drawing/2010/main">
-                <a:solidFill>
-                  <a:schemeClr val="accent1"/>
-                </a:solidFill>
-              </a14:hiddenFill>
-            </a:ext>
-            <a:ext uri="{91240B29-F687-4F45-9708-019B960494DF}">
-              <a14:hiddenLine xmlns:a14="http://schemas.microsoft.com/office/drawing/2010/main" w="9525">
-                <a:solidFill>
-                  <a:schemeClr val="tx1"/>
-                </a:solidFill>
-                <a:miter lim="800000"/>
-                <a:headEnd/>
-                <a:tailEnd/>
-              </a14:hiddenLine>
-            </a:ext>
-          </a:extLst>
-        </p:spPr>
-      </p:pic>
-      <p:pic>
-        <p:nvPicPr>
-          <p:cNvPr id="2054" name="Picture 6"/>
-          <p:cNvPicPr>
-            <a:picLocks noChangeAspect="1" noChangeArrowheads="1"/>
-          </p:cNvPicPr>
-          <p:nvPr/>
-        </p:nvPicPr>
-        <p:blipFill>
-          <a:blip r:embed="rId10">
-            <a:extLst>
-              <a:ext uri="{28A0092B-C50C-407E-A947-70E740481C1C}">
-                <a14:useLocalDpi xmlns:a14="http://schemas.microsoft.com/office/drawing/2010/main" val="0"/>
-              </a:ext>
-            </a:extLst>
-          </a:blip>
-          <a:srcRect/>
-          <a:stretch>
-            <a:fillRect/>
-          </a:stretch>
-        </p:blipFill>
-        <p:spPr bwMode="auto">
-          <a:xfrm>
-            <a:off x="0" y="3238847"/>
-            <a:ext cx="3240000" cy="1740706"/>
-          </a:xfrm>
-          <a:prstGeom prst="rect">
-            <a:avLst/>
-          </a:prstGeom>
-          <a:noFill/>
-          <a:ln>
-            <a:noFill/>
-          </a:ln>
-          <a:extLst>
-            <a:ext uri="{909E8E84-426E-40DD-AFC4-6F175D3DCCD1}">
-              <a14:hiddenFill xmlns:a14="http://schemas.microsoft.com/office/drawing/2010/main">
-                <a:solidFill>
-                  <a:schemeClr val="accent1"/>
-                </a:solidFill>
-              </a14:hiddenFill>
-            </a:ext>
-            <a:ext uri="{91240B29-F687-4F45-9708-019B960494DF}">
-              <a14:hiddenLine xmlns:a14="http://schemas.microsoft.com/office/drawing/2010/main" w="9525">
-                <a:solidFill>
-                  <a:schemeClr val="tx1"/>
-                </a:solidFill>
-                <a:miter lim="800000"/>
-                <a:headEnd/>
-                <a:tailEnd/>
-              </a14:hiddenLine>
-            </a:ext>
-          </a:extLst>
-        </p:spPr>
-      </p:pic>
-      <p:pic>
-        <p:nvPicPr>
-          <p:cNvPr id="2059" name="Picture 11"/>
-          <p:cNvPicPr>
-            <a:picLocks noChangeAspect="1" noChangeArrowheads="1"/>
-          </p:cNvPicPr>
-          <p:nvPr/>
-        </p:nvPicPr>
-        <p:blipFill>
-          <a:blip r:embed="rId11">
-            <a:extLst>
-              <a:ext uri="{28A0092B-C50C-407E-A947-70E740481C1C}">
-                <a14:useLocalDpi xmlns:a14="http://schemas.microsoft.com/office/drawing/2010/main" val="0"/>
-              </a:ext>
-            </a:extLst>
-          </a:blip>
-          <a:srcRect/>
-          <a:stretch>
-            <a:fillRect/>
-          </a:stretch>
-        </p:blipFill>
-        <p:spPr bwMode="auto">
-          <a:xfrm>
-            <a:off x="6678350" y="3277240"/>
-            <a:ext cx="3240000" cy="1716031"/>
-          </a:xfrm>
-          <a:prstGeom prst="rect">
-            <a:avLst/>
-          </a:prstGeom>
-          <a:noFill/>
-          <a:ln>
-            <a:noFill/>
-          </a:ln>
-          <a:extLst>
-            <a:ext uri="{909E8E84-426E-40DD-AFC4-6F175D3DCCD1}">
-              <a14:hiddenFill xmlns:a14="http://schemas.microsoft.com/office/drawing/2010/main">
-                <a:solidFill>
-                  <a:schemeClr val="accent1"/>
-                </a:solidFill>
-              </a14:hiddenFill>
-            </a:ext>
-            <a:ext uri="{91240B29-F687-4F45-9708-019B960494DF}">
-              <a14:hiddenLine xmlns:a14="http://schemas.microsoft.com/office/drawing/2010/main" w="9525">
-                <a:solidFill>
-                  <a:schemeClr val="tx1"/>
-                </a:solidFill>
-                <a:miter lim="800000"/>
-                <a:headEnd/>
-                <a:tailEnd/>
-              </a14:hiddenLine>
-            </a:ext>
-          </a:extLst>
-        </p:spPr>
-      </p:pic>
-      <p:pic>
-        <p:nvPicPr>
-          <p:cNvPr id="2060" name="Picture 12"/>
-          <p:cNvPicPr>
-            <a:picLocks noChangeAspect="1" noChangeArrowheads="1"/>
-          </p:cNvPicPr>
-          <p:nvPr/>
-        </p:nvPicPr>
-        <p:blipFill>
-          <a:blip r:embed="rId12">
-            <a:extLst>
-              <a:ext uri="{28A0092B-C50C-407E-A947-70E740481C1C}">
-                <a14:useLocalDpi xmlns:a14="http://schemas.microsoft.com/office/drawing/2010/main" val="0"/>
-              </a:ext>
-            </a:extLst>
-          </a:blip>
-          <a:srcRect/>
-          <a:stretch>
-            <a:fillRect/>
-          </a:stretch>
-        </p:blipFill>
-        <p:spPr bwMode="auto">
-          <a:xfrm>
-            <a:off x="6666000" y="5148155"/>
-            <a:ext cx="3240000" cy="1703721"/>
-          </a:xfrm>
-          <a:prstGeom prst="rect">
-            <a:avLst/>
-          </a:prstGeom>
-          <a:noFill/>
-          <a:ln>
-            <a:noFill/>
-          </a:ln>
-          <a:extLst>
-            <a:ext uri="{909E8E84-426E-40DD-AFC4-6F175D3DCCD1}">
-              <a14:hiddenFill xmlns:a14="http://schemas.microsoft.com/office/drawing/2010/main">
-                <a:solidFill>
-                  <a:schemeClr val="accent1"/>
-                </a:solidFill>
-              </a14:hiddenFill>
-            </a:ext>
-            <a:ext uri="{91240B29-F687-4F45-9708-019B960494DF}">
-              <a14:hiddenLine xmlns:a14="http://schemas.microsoft.com/office/drawing/2010/main" w="9525">
-                <a:solidFill>
-                  <a:schemeClr val="tx1"/>
-                </a:solidFill>
-                <a:miter lim="800000"/>
-                <a:headEnd/>
-                <a:tailEnd/>
-              </a14:hiddenLine>
-            </a:ext>
-          </a:extLst>
-        </p:spPr>
-      </p:pic>
-    </p:spTree>
-    <p:extLst>
-      <p:ext uri="{BB962C8B-B14F-4D97-AF65-F5344CB8AC3E}">
-        <p14:creationId xmlns:p14="http://schemas.microsoft.com/office/powerpoint/2010/main" val="2740437243"/>
       </p:ext>
     </p:extLst>
   </p:cSld>
@@ -14367,143 +15020,6 @@
       </p:pic>
       <p:sp>
         <p:nvSpPr>
-          <p:cNvPr id="196" name="Google Shape;196;p28"/>
-          <p:cNvSpPr txBox="1"/>
-          <p:nvPr/>
-        </p:nvSpPr>
-        <p:spPr>
-          <a:xfrm>
-            <a:off x="0" y="785123"/>
-            <a:ext cx="9906000" cy="727152"/>
-          </a:xfrm>
-          <a:prstGeom prst="rect">
-            <a:avLst/>
-          </a:prstGeom>
-          <a:noFill/>
-          <a:ln>
-            <a:noFill/>
-          </a:ln>
-        </p:spPr>
-        <p:txBody>
-          <a:bodyPr spcFirstLastPara="1" wrap="square" lIns="91425" tIns="91425" rIns="91425" bIns="91425" anchor="t" anchorCtr="0">
-            <a:noAutofit/>
-          </a:bodyPr>
-          <a:lstStyle/>
-          <a:p>
-            <a:pPr lvl="0"/>
-            <a:r>
-              <a:rPr lang="en-US" sz="1600" dirty="0" smtClean="0">
-                <a:solidFill>
-                  <a:schemeClr val="dk1"/>
-                </a:solidFill>
-                <a:latin typeface="Calibri"/>
-                <a:ea typeface="Calibri"/>
-                <a:cs typeface="Calibri"/>
-              </a:rPr>
-              <a:t>- 04 </a:t>
-            </a:r>
-            <a:r>
-              <a:rPr lang="en-US" sz="1600" dirty="0" smtClean="0">
-                <a:solidFill>
-                  <a:schemeClr val="dk1"/>
-                </a:solidFill>
-                <a:latin typeface="Calibri"/>
-                <a:ea typeface="Calibri"/>
-                <a:cs typeface="Calibri"/>
-              </a:rPr>
-              <a:t>modeling scenarios have been suggested basing on strategy of using these features: </a:t>
-            </a:r>
-            <a:r>
-              <a:rPr lang="en-US" sz="1600" dirty="0" err="1" smtClean="0">
-                <a:solidFill>
-                  <a:schemeClr val="dk1"/>
-                </a:solidFill>
-                <a:latin typeface="Calibri"/>
-                <a:ea typeface="Calibri"/>
-                <a:cs typeface="Calibri"/>
-              </a:rPr>
-              <a:t>vertical_drop</a:t>
-            </a:r>
-            <a:r>
-              <a:rPr lang="en-US" sz="1600" dirty="0">
-                <a:solidFill>
-                  <a:schemeClr val="dk1"/>
-                </a:solidFill>
-                <a:latin typeface="Calibri"/>
-                <a:ea typeface="Calibri"/>
-                <a:cs typeface="Calibri"/>
-              </a:rPr>
-              <a:t>, Snow </a:t>
-            </a:r>
-            <a:r>
-              <a:rPr lang="en-US" sz="1600" dirty="0" err="1">
-                <a:solidFill>
-                  <a:schemeClr val="dk1"/>
-                </a:solidFill>
-                <a:latin typeface="Calibri"/>
-                <a:ea typeface="Calibri"/>
-                <a:cs typeface="Calibri"/>
-              </a:rPr>
-              <a:t>Making_ac</a:t>
-            </a:r>
-            <a:r>
-              <a:rPr lang="en-US" sz="1600" dirty="0">
-                <a:solidFill>
-                  <a:schemeClr val="dk1"/>
-                </a:solidFill>
-                <a:latin typeface="Calibri"/>
-                <a:ea typeface="Calibri"/>
-                <a:cs typeface="Calibri"/>
-              </a:rPr>
-              <a:t>, </a:t>
-            </a:r>
-            <a:r>
-              <a:rPr lang="en-US" sz="1600" dirty="0" err="1">
-                <a:solidFill>
-                  <a:schemeClr val="dk1"/>
-                </a:solidFill>
-                <a:latin typeface="Calibri"/>
-                <a:ea typeface="Calibri"/>
-                <a:cs typeface="Calibri"/>
-              </a:rPr>
-              <a:t>total_chairs</a:t>
-            </a:r>
-            <a:r>
-              <a:rPr lang="en-US" sz="1600" dirty="0" smtClean="0">
-                <a:solidFill>
-                  <a:schemeClr val="dk1"/>
-                </a:solidFill>
-                <a:latin typeface="Calibri"/>
-                <a:ea typeface="Calibri"/>
-                <a:cs typeface="Calibri"/>
-              </a:rPr>
-              <a:t>, Runs, </a:t>
-            </a:r>
-            <a:r>
-              <a:rPr lang="en-US" sz="1600" dirty="0" err="1" smtClean="0">
-                <a:solidFill>
-                  <a:schemeClr val="dk1"/>
-                </a:solidFill>
-                <a:latin typeface="Calibri"/>
-                <a:ea typeface="Calibri"/>
-                <a:cs typeface="Calibri"/>
-              </a:rPr>
-              <a:t>LongestRun_mi</a:t>
-            </a:r>
-            <a:endParaRPr sz="1600" dirty="0">
-              <a:solidFill>
-                <a:schemeClr val="dk1"/>
-              </a:solidFill>
-              <a:latin typeface="Calibri"/>
-              <a:ea typeface="Calibri"/>
-              <a:cs typeface="Calibri"/>
-              <a:sym typeface="Calibri"/>
-            </a:endParaRPr>
-          </a:p>
-        </p:txBody>
-      </p:sp>
-      <p:sp>
-        <p:nvSpPr>
           <p:cNvPr id="204" name="Google Shape;204;p28"/>
           <p:cNvSpPr txBox="1">
             <a:spLocks noGrp="1"/>
@@ -14628,7 +15144,37 @@
                 <a:cs typeface="Calibri"/>
                 <a:sym typeface="Roboto"/>
               </a:rPr>
-              <a:t>RF Model Deployment in Market Context</a:t>
+              <a:t>Model </a:t>
+            </a:r>
+            <a:r>
+              <a:rPr lang="en-US" sz="2000" b="1" dirty="0" err="1" smtClean="0">
+                <a:solidFill>
+                  <a:schemeClr val="tx2">
+                    <a:lumMod val="60000"/>
+                    <a:lumOff val="40000"/>
+                  </a:schemeClr>
+                </a:solidFill>
+                <a:latin typeface="Roboto"/>
+                <a:ea typeface="Calibri"/>
+                <a:cs typeface="Calibri"/>
+                <a:sym typeface="Roboto"/>
+              </a:rPr>
+              <a:t>Params</a:t>
+            </a:r>
+            <a:r>
+              <a:rPr lang="en-US" sz="2000" b="1" dirty="0" smtClean="0">
+                <a:solidFill>
+                  <a:schemeClr val="tx2">
+                    <a:lumMod val="60000"/>
+                    <a:lumOff val="40000"/>
+                  </a:schemeClr>
+                </a:solidFill>
+                <a:latin typeface="Roboto"/>
+                <a:ea typeface="Calibri"/>
+                <a:cs typeface="Calibri"/>
+                <a:sym typeface="Roboto"/>
+              </a:rPr>
+              <a:t> Filtering</a:t>
             </a:r>
             <a:endParaRPr sz="2000" dirty="0">
               <a:solidFill>
@@ -14645,15 +15191,154 @@
           </a:p>
         </p:txBody>
       </p:sp>
+      <p:sp>
+        <p:nvSpPr>
+          <p:cNvPr id="11" name="Google Shape;196;p28"/>
+          <p:cNvSpPr txBox="1"/>
+          <p:nvPr/>
+        </p:nvSpPr>
+        <p:spPr>
+          <a:xfrm>
+            <a:off x="0" y="759485"/>
+            <a:ext cx="6576111" cy="727152"/>
+          </a:xfrm>
+          <a:prstGeom prst="rect">
+            <a:avLst/>
+          </a:prstGeom>
+          <a:noFill/>
+          <a:ln>
+            <a:noFill/>
+          </a:ln>
+        </p:spPr>
+        <p:txBody>
+          <a:bodyPr spcFirstLastPara="1" wrap="square" lIns="91425" tIns="91425" rIns="91425" bIns="91425" anchor="t" anchorCtr="0">
+            <a:noAutofit/>
+          </a:bodyPr>
+          <a:lstStyle/>
+          <a:p>
+            <a:pPr lvl="0"/>
+            <a:r>
+              <a:rPr lang="en-US" sz="1600" b="1" dirty="0" smtClean="0">
+                <a:solidFill>
+                  <a:schemeClr val="dk1"/>
+                </a:solidFill>
+                <a:latin typeface="Calibri"/>
+                <a:ea typeface="Calibri"/>
+                <a:cs typeface="Calibri"/>
+              </a:rPr>
+              <a:t>Features </a:t>
+            </a:r>
+            <a:r>
+              <a:rPr lang="en-US" sz="1600" dirty="0" smtClean="0">
+                <a:solidFill>
+                  <a:schemeClr val="dk1"/>
+                </a:solidFill>
+                <a:latin typeface="Calibri"/>
+                <a:ea typeface="Calibri"/>
+                <a:cs typeface="Calibri"/>
+              </a:rPr>
+              <a:t>(</a:t>
+            </a:r>
+            <a:r>
+              <a:rPr lang="en-US" sz="1600" dirty="0" err="1" smtClean="0">
+                <a:solidFill>
+                  <a:schemeClr val="dk1"/>
+                </a:solidFill>
+                <a:latin typeface="Calibri"/>
+                <a:ea typeface="Calibri"/>
+                <a:cs typeface="Calibri"/>
+              </a:rPr>
+              <a:t>total_chairs</a:t>
+            </a:r>
+            <a:r>
+              <a:rPr lang="en-US" sz="1600" dirty="0" smtClean="0">
+                <a:solidFill>
+                  <a:schemeClr val="dk1"/>
+                </a:solidFill>
+                <a:latin typeface="Calibri"/>
+                <a:ea typeface="Calibri"/>
+                <a:cs typeface="Calibri"/>
+              </a:rPr>
+              <a:t>, </a:t>
+            </a:r>
+            <a:r>
+              <a:rPr lang="en-US" sz="1600" dirty="0" err="1" smtClean="0">
+                <a:solidFill>
+                  <a:schemeClr val="dk1"/>
+                </a:solidFill>
+                <a:latin typeface="Calibri"/>
+                <a:ea typeface="Calibri"/>
+                <a:cs typeface="Calibri"/>
+              </a:rPr>
+              <a:t>LongestRun_mi</a:t>
+            </a:r>
+            <a:r>
+              <a:rPr lang="en-US" sz="1600" dirty="0" smtClean="0">
+                <a:solidFill>
+                  <a:schemeClr val="dk1"/>
+                </a:solidFill>
+                <a:latin typeface="Calibri"/>
+                <a:ea typeface="Calibri"/>
+                <a:cs typeface="Calibri"/>
+              </a:rPr>
+              <a:t>, </a:t>
+            </a:r>
+            <a:r>
+              <a:rPr lang="en-US" sz="1600" dirty="0" err="1">
+                <a:solidFill>
+                  <a:schemeClr val="dk1"/>
+                </a:solidFill>
+                <a:latin typeface="Calibri"/>
+                <a:ea typeface="Calibri"/>
+                <a:cs typeface="Calibri"/>
+              </a:rPr>
+              <a:t>fastQuads</a:t>
+            </a:r>
+            <a:r>
+              <a:rPr lang="en-US" sz="1600" dirty="0">
+                <a:solidFill>
+                  <a:schemeClr val="dk1"/>
+                </a:solidFill>
+                <a:latin typeface="Calibri"/>
+                <a:ea typeface="Calibri"/>
+                <a:cs typeface="Calibri"/>
+              </a:rPr>
+              <a:t>, trams, </a:t>
+            </a:r>
+            <a:r>
+              <a:rPr lang="en-US" sz="1600" dirty="0" err="1" smtClean="0">
+                <a:solidFill>
+                  <a:schemeClr val="dk1"/>
+                </a:solidFill>
+                <a:latin typeface="Calibri"/>
+                <a:ea typeface="Calibri"/>
+                <a:cs typeface="Calibri"/>
+              </a:rPr>
+              <a:t>SkiableTerrain_ac</a:t>
+            </a:r>
+            <a:r>
+              <a:rPr lang="en-US" sz="1600" dirty="0" smtClean="0">
+                <a:solidFill>
+                  <a:schemeClr val="dk1"/>
+                </a:solidFill>
+                <a:latin typeface="Calibri"/>
+                <a:ea typeface="Calibri"/>
+                <a:cs typeface="Calibri"/>
+              </a:rPr>
+              <a:t>) </a:t>
+            </a:r>
+          </a:p>
+        </p:txBody>
+      </p:sp>
       <p:pic>
         <p:nvPicPr>
-          <p:cNvPr id="4099" name="Picture 3"/>
+          <p:cNvPr id="2050" name="Picture 2"/>
           <p:cNvPicPr>
             <a:picLocks noChangeAspect="1" noChangeArrowheads="1"/>
           </p:cNvPicPr>
           <p:nvPr/>
         </p:nvPicPr>
-        <p:blipFill>
+        <p:blipFill rotWithShape="1">
           <a:blip r:embed="rId4">
             <a:extLst>
               <a:ext uri="{28A0092B-C50C-407E-A947-70E740481C1C}">
@@ -14661,15 +15346,13 @@
               </a:ext>
             </a:extLst>
           </a:blip>
-          <a:srcRect/>
-          <a:stretch>
-            <a:fillRect/>
-          </a:stretch>
+          <a:srcRect r="50000"/>
+          <a:stretch/>
         </p:blipFill>
         <p:spPr bwMode="auto">
           <a:xfrm>
-            <a:off x="0" y="1617486"/>
-            <a:ext cx="3240000" cy="1768446"/>
+            <a:off x="1620000" y="1941953"/>
+            <a:ext cx="1620000" cy="1756781"/>
           </a:xfrm>
           <a:prstGeom prst="rect">
             <a:avLst/>
@@ -14701,13 +15384,13 @@
       </p:pic>
       <p:pic>
         <p:nvPicPr>
-          <p:cNvPr id="4100" name="Picture 4"/>
+          <p:cNvPr id="2053" name="Picture 5"/>
           <p:cNvPicPr>
             <a:picLocks noChangeAspect="1" noChangeArrowheads="1"/>
           </p:cNvPicPr>
           <p:nvPr/>
         </p:nvPicPr>
-        <p:blipFill>
+        <p:blipFill rotWithShape="1">
           <a:blip r:embed="rId5">
             <a:extLst>
               <a:ext uri="{28A0092B-C50C-407E-A947-70E740481C1C}">
@@ -14715,15 +15398,13 @@
               </a:ext>
             </a:extLst>
           </a:blip>
-          <a:srcRect/>
-          <a:stretch>
-            <a:fillRect/>
-          </a:stretch>
+          <a:srcRect r="50680"/>
+          <a:stretch/>
         </p:blipFill>
         <p:spPr bwMode="auto">
           <a:xfrm>
-            <a:off x="3240000" y="1617486"/>
-            <a:ext cx="3240000" cy="1762560"/>
+            <a:off x="22028" y="1941953"/>
+            <a:ext cx="1597972" cy="1733907"/>
           </a:xfrm>
           <a:prstGeom prst="rect">
             <a:avLst/>
@@ -14755,13 +15436,13 @@
       </p:pic>
       <p:pic>
         <p:nvPicPr>
-          <p:cNvPr id="4101" name="Picture 5"/>
+          <p:cNvPr id="2055" name="Picture 7"/>
           <p:cNvPicPr>
             <a:picLocks noChangeAspect="1" noChangeArrowheads="1"/>
           </p:cNvPicPr>
           <p:nvPr/>
         </p:nvPicPr>
-        <p:blipFill>
+        <p:blipFill rotWithShape="1">
           <a:blip r:embed="rId6">
             <a:extLst>
               <a:ext uri="{28A0092B-C50C-407E-A947-70E740481C1C}">
@@ -14769,15 +15450,13 @@
               </a:ext>
             </a:extLst>
           </a:blip>
-          <a:srcRect/>
-          <a:stretch>
-            <a:fillRect/>
-          </a:stretch>
+          <a:srcRect r="48474"/>
+          <a:stretch/>
         </p:blipFill>
         <p:spPr bwMode="auto">
           <a:xfrm>
-            <a:off x="0" y="3375609"/>
-            <a:ext cx="3240000" cy="1749256"/>
+            <a:off x="6495587" y="1377213"/>
+            <a:ext cx="1669444" cy="1716279"/>
           </a:xfrm>
           <a:prstGeom prst="rect">
             <a:avLst/>
@@ -14809,13 +15488,13 @@
       </p:pic>
       <p:pic>
         <p:nvPicPr>
-          <p:cNvPr id="4102" name="Picture 6"/>
+          <p:cNvPr id="2056" name="Picture 8"/>
           <p:cNvPicPr>
             <a:picLocks noChangeAspect="1" noChangeArrowheads="1"/>
           </p:cNvPicPr>
           <p:nvPr/>
         </p:nvPicPr>
-        <p:blipFill>
+        <p:blipFill rotWithShape="1">
           <a:blip r:embed="rId7">
             <a:extLst>
               <a:ext uri="{28A0092B-C50C-407E-A947-70E740481C1C}">
@@ -14823,15 +15502,13 @@
               </a:ext>
             </a:extLst>
           </a:blip>
-          <a:srcRect/>
-          <a:stretch>
-            <a:fillRect/>
-          </a:stretch>
+          <a:srcRect r="50191"/>
+          <a:stretch/>
         </p:blipFill>
         <p:spPr bwMode="auto">
           <a:xfrm>
-            <a:off x="0" y="5124862"/>
-            <a:ext cx="3240000" cy="1740638"/>
+            <a:off x="6598139" y="3193610"/>
+            <a:ext cx="1613825" cy="1764527"/>
           </a:xfrm>
           <a:prstGeom prst="rect">
             <a:avLst/>
@@ -14863,13 +15540,13 @@
       </p:pic>
       <p:pic>
         <p:nvPicPr>
-          <p:cNvPr id="3075" name="Picture 3"/>
+          <p:cNvPr id="2057" name="Picture 9"/>
           <p:cNvPicPr>
             <a:picLocks noChangeAspect="1" noChangeArrowheads="1"/>
           </p:cNvPicPr>
           <p:nvPr/>
         </p:nvPicPr>
-        <p:blipFill>
+        <p:blipFill rotWithShape="1">
           <a:blip r:embed="rId8">
             <a:extLst>
               <a:ext uri="{28A0092B-C50C-407E-A947-70E740481C1C}">
@@ -14877,15 +15554,13 @@
               </a:ext>
             </a:extLst>
           </a:blip>
-          <a:srcRect/>
-          <a:stretch>
-            <a:fillRect/>
-          </a:stretch>
+          <a:srcRect r="50680"/>
+          <a:stretch/>
         </p:blipFill>
         <p:spPr bwMode="auto">
           <a:xfrm>
-            <a:off x="3240000" y="3409864"/>
-            <a:ext cx="3240000" cy="1740639"/>
+            <a:off x="4978139" y="3218590"/>
+            <a:ext cx="1597972" cy="1747225"/>
           </a:xfrm>
           <a:prstGeom prst="rect">
             <a:avLst/>
@@ -14915,31 +15590,247 @@
           </a:extLst>
         </p:spPr>
       </p:pic>
+      <p:pic>
+        <p:nvPicPr>
+          <p:cNvPr id="2058" name="Picture 10"/>
+          <p:cNvPicPr>
+            <a:picLocks noChangeAspect="1" noChangeArrowheads="1"/>
+          </p:cNvPicPr>
+          <p:nvPr/>
+        </p:nvPicPr>
+        <p:blipFill rotWithShape="1">
+          <a:blip r:embed="rId9">
+            <a:extLst>
+              <a:ext uri="{28A0092B-C50C-407E-A947-70E740481C1C}">
+                <a14:useLocalDpi xmlns:a14="http://schemas.microsoft.com/office/drawing/2010/main" val="0"/>
+              </a:ext>
+            </a:extLst>
+          </a:blip>
+          <a:srcRect r="50000"/>
+          <a:stretch/>
+        </p:blipFill>
+        <p:spPr bwMode="auto">
+          <a:xfrm>
+            <a:off x="8286000" y="2333845"/>
+            <a:ext cx="1620000" cy="1719529"/>
+          </a:xfrm>
+          <a:prstGeom prst="rect">
+            <a:avLst/>
+          </a:prstGeom>
+          <a:noFill/>
+          <a:ln>
+            <a:noFill/>
+          </a:ln>
+          <a:extLst>
+            <a:ext uri="{909E8E84-426E-40DD-AFC4-6F175D3DCCD1}">
+              <a14:hiddenFill xmlns:a14="http://schemas.microsoft.com/office/drawing/2010/main">
+                <a:solidFill>
+                  <a:schemeClr val="accent1"/>
+                </a:solidFill>
+              </a14:hiddenFill>
+            </a:ext>
+            <a:ext uri="{91240B29-F687-4F45-9708-019B960494DF}">
+              <a14:hiddenLine xmlns:a14="http://schemas.microsoft.com/office/drawing/2010/main" w="9525">
+                <a:solidFill>
+                  <a:schemeClr val="tx1"/>
+                </a:solidFill>
+                <a:miter lim="800000"/>
+                <a:headEnd/>
+                <a:tailEnd/>
+              </a14:hiddenLine>
+            </a:ext>
+          </a:extLst>
+        </p:spPr>
+      </p:pic>
+      <p:pic>
+        <p:nvPicPr>
+          <p:cNvPr id="2054" name="Picture 6"/>
+          <p:cNvPicPr>
+            <a:picLocks noChangeAspect="1" noChangeArrowheads="1"/>
+          </p:cNvPicPr>
+          <p:nvPr/>
+        </p:nvPicPr>
+        <p:blipFill rotWithShape="1">
+          <a:blip r:embed="rId10">
+            <a:extLst>
+              <a:ext uri="{28A0092B-C50C-407E-A947-70E740481C1C}">
+                <a14:useLocalDpi xmlns:a14="http://schemas.microsoft.com/office/drawing/2010/main" val="0"/>
+              </a:ext>
+            </a:extLst>
+          </a:blip>
+          <a:srcRect r="49320"/>
+          <a:stretch/>
+        </p:blipFill>
+        <p:spPr bwMode="auto">
+          <a:xfrm>
+            <a:off x="4956111" y="1352786"/>
+            <a:ext cx="1642028" cy="1740706"/>
+          </a:xfrm>
+          <a:prstGeom prst="rect">
+            <a:avLst/>
+          </a:prstGeom>
+          <a:noFill/>
+          <a:ln>
+            <a:noFill/>
+          </a:ln>
+          <a:extLst>
+            <a:ext uri="{909E8E84-426E-40DD-AFC4-6F175D3DCCD1}">
+              <a14:hiddenFill xmlns:a14="http://schemas.microsoft.com/office/drawing/2010/main">
+                <a:solidFill>
+                  <a:schemeClr val="accent1"/>
+                </a:solidFill>
+              </a14:hiddenFill>
+            </a:ext>
+            <a:ext uri="{91240B29-F687-4F45-9708-019B960494DF}">
+              <a14:hiddenLine xmlns:a14="http://schemas.microsoft.com/office/drawing/2010/main" w="9525">
+                <a:solidFill>
+                  <a:schemeClr val="tx1"/>
+                </a:solidFill>
+                <a:miter lim="800000"/>
+                <a:headEnd/>
+                <a:tailEnd/>
+              </a14:hiddenLine>
+            </a:ext>
+          </a:extLst>
+        </p:spPr>
+      </p:pic>
+      <p:pic>
+        <p:nvPicPr>
+          <p:cNvPr id="2059" name="Picture 11"/>
+          <p:cNvPicPr>
+            <a:picLocks noChangeAspect="1" noChangeArrowheads="1"/>
+          </p:cNvPicPr>
+          <p:nvPr/>
+        </p:nvPicPr>
+        <p:blipFill rotWithShape="1">
+          <a:blip r:embed="rId11">
+            <a:extLst>
+              <a:ext uri="{28A0092B-C50C-407E-A947-70E740481C1C}">
+                <a14:useLocalDpi xmlns:a14="http://schemas.microsoft.com/office/drawing/2010/main" val="0"/>
+              </a:ext>
+            </a:extLst>
+          </a:blip>
+          <a:srcRect r="50000"/>
+          <a:stretch/>
+        </p:blipFill>
+        <p:spPr bwMode="auto">
+          <a:xfrm>
+            <a:off x="4978139" y="5099990"/>
+            <a:ext cx="1620000" cy="1716031"/>
+          </a:xfrm>
+          <a:prstGeom prst="rect">
+            <a:avLst/>
+          </a:prstGeom>
+          <a:noFill/>
+          <a:ln>
+            <a:noFill/>
+          </a:ln>
+          <a:extLst>
+            <a:ext uri="{909E8E84-426E-40DD-AFC4-6F175D3DCCD1}">
+              <a14:hiddenFill xmlns:a14="http://schemas.microsoft.com/office/drawing/2010/main">
+                <a:solidFill>
+                  <a:schemeClr val="accent1"/>
+                </a:solidFill>
+              </a14:hiddenFill>
+            </a:ext>
+            <a:ext uri="{91240B29-F687-4F45-9708-019B960494DF}">
+              <a14:hiddenLine xmlns:a14="http://schemas.microsoft.com/office/drawing/2010/main" w="9525">
+                <a:solidFill>
+                  <a:schemeClr val="tx1"/>
+                </a:solidFill>
+                <a:miter lim="800000"/>
+                <a:headEnd/>
+                <a:tailEnd/>
+              </a14:hiddenLine>
+            </a:ext>
+          </a:extLst>
+        </p:spPr>
+      </p:pic>
+      <p:pic>
+        <p:nvPicPr>
+          <p:cNvPr id="2060" name="Picture 12"/>
+          <p:cNvPicPr>
+            <a:picLocks noChangeAspect="1" noChangeArrowheads="1"/>
+          </p:cNvPicPr>
+          <p:nvPr/>
+        </p:nvPicPr>
+        <p:blipFill rotWithShape="1">
+          <a:blip r:embed="rId12">
+            <a:extLst>
+              <a:ext uri="{28A0092B-C50C-407E-A947-70E740481C1C}">
+                <a14:useLocalDpi xmlns:a14="http://schemas.microsoft.com/office/drawing/2010/main" val="0"/>
+              </a:ext>
+            </a:extLst>
+          </a:blip>
+          <a:srcRect r="49619"/>
+          <a:stretch/>
+        </p:blipFill>
+        <p:spPr bwMode="auto">
+          <a:xfrm>
+            <a:off x="6598139" y="5112300"/>
+            <a:ext cx="1632350" cy="1703721"/>
+          </a:xfrm>
+          <a:prstGeom prst="rect">
+            <a:avLst/>
+          </a:prstGeom>
+          <a:noFill/>
+          <a:ln>
+            <a:noFill/>
+          </a:ln>
+          <a:extLst>
+            <a:ext uri="{909E8E84-426E-40DD-AFC4-6F175D3DCCD1}">
+              <a14:hiddenFill xmlns:a14="http://schemas.microsoft.com/office/drawing/2010/main">
+                <a:solidFill>
+                  <a:schemeClr val="accent1"/>
+                </a:solidFill>
+              </a14:hiddenFill>
+            </a:ext>
+            <a:ext uri="{91240B29-F687-4F45-9708-019B960494DF}">
+              <a14:hiddenLine xmlns:a14="http://schemas.microsoft.com/office/drawing/2010/main" w="9525">
+                <a:solidFill>
+                  <a:schemeClr val="tx1"/>
+                </a:solidFill>
+                <a:miter lim="800000"/>
+                <a:headEnd/>
+                <a:tailEnd/>
+              </a14:hiddenLine>
+            </a:ext>
+          </a:extLst>
+        </p:spPr>
+      </p:pic>
       <p:sp>
         <p:nvSpPr>
-          <p:cNvPr id="2" name="TextBox 1"/>
-          <p:cNvSpPr txBox="1"/>
+          <p:cNvPr id="2" name="Rectangle 1"/>
+          <p:cNvSpPr/>
           <p:nvPr/>
         </p:nvSpPr>
         <p:spPr>
           <a:xfrm>
-            <a:off x="6480000" y="1717087"/>
-            <a:ext cx="3426000" cy="4770537"/>
+            <a:off x="5189587" y="1071509"/>
+            <a:ext cx="4081567" cy="338554"/>
           </a:xfrm>
           <a:prstGeom prst="rect">
             <a:avLst/>
           </a:prstGeom>
-          <a:noFill/>
         </p:spPr>
         <p:txBody>
-          <a:bodyPr wrap="square" rtlCol="0">
+          <a:bodyPr wrap="none">
             <a:spAutoFit/>
           </a:bodyPr>
           <a:lstStyle/>
           <a:p>
-            <a:pPr marL="342900" indent="-342900">
-              <a:buAutoNum type="arabicPeriod"/>
-            </a:pPr>
+            <a:pPr lvl="0"/>
+            <a:r>
+              <a:rPr lang="en-US" sz="1600" dirty="0" smtClean="0">
+                <a:solidFill>
+                  <a:schemeClr val="dk1"/>
+                </a:solidFill>
+                <a:latin typeface="Calibri"/>
+                <a:ea typeface="Calibri"/>
+                <a:cs typeface="Calibri"/>
+              </a:rPr>
+              <a:t>The rest of features </a:t>
+            </a:r>
             <a:r>
               <a:rPr lang="en-US" sz="1600" dirty="0">
                 <a:solidFill>
@@ -14949,43 +15840,8 @@
                 <a:ea typeface="Calibri"/>
                 <a:cs typeface="Calibri"/>
               </a:rPr>
-              <a:t>Permanently </a:t>
-            </a:r>
-            <a:r>
-              <a:rPr lang="en-US" sz="1600" dirty="0">
-                <a:solidFill>
-                  <a:schemeClr val="dk1"/>
-                </a:solidFill>
-                <a:latin typeface="Calibri"/>
-                <a:ea typeface="Calibri"/>
-                <a:cs typeface="Calibri"/>
-              </a:rPr>
-              <a:t>closing down up to 10 of the least used runs. </a:t>
-            </a:r>
-            <a:r>
-              <a:rPr lang="en-US" sz="1600" dirty="0">
-                <a:solidFill>
-                  <a:schemeClr val="dk1"/>
-                </a:solidFill>
-                <a:latin typeface="Calibri"/>
-                <a:ea typeface="Calibri"/>
-                <a:cs typeface="Calibri"/>
-              </a:rPr>
-              <a:t>This doesn't impact any other resort statistics. </a:t>
-            </a:r>
-            <a:endParaRPr lang="en-US" sz="1600" dirty="0" smtClean="0">
-              <a:solidFill>
-                <a:schemeClr val="dk1"/>
-              </a:solidFill>
-              <a:latin typeface="Calibri"/>
-              <a:ea typeface="Calibri"/>
-              <a:cs typeface="Calibri"/>
-            </a:endParaRPr>
-          </a:p>
-          <a:p>
-            <a:pPr marL="342900" indent="-342900">
-              <a:buAutoNum type="arabicPeriod"/>
-            </a:pPr>
+              <a:t>are not feasible to change </a:t>
+            </a:r>
             <a:endParaRPr lang="en-US" sz="1600" dirty="0">
               <a:solidFill>
                 <a:schemeClr val="dk1"/>
@@ -14993,12 +15849,44 @@
               <a:latin typeface="Calibri"/>
               <a:ea typeface="Calibri"/>
               <a:cs typeface="Calibri"/>
+              <a:sym typeface="Calibri"/>
             </a:endParaRPr>
           </a:p>
-          <a:p>
-            <a:pPr marL="342900" indent="-342900">
-              <a:buAutoNum type="arabicPeriod"/>
-            </a:pPr>
+        </p:txBody>
+      </p:sp>
+      <p:sp>
+        <p:nvSpPr>
+          <p:cNvPr id="3" name="Rectangle 2"/>
+          <p:cNvSpPr/>
+          <p:nvPr/>
+        </p:nvSpPr>
+        <p:spPr>
+          <a:xfrm>
+            <a:off x="0" y="1352786"/>
+            <a:ext cx="3377369" cy="584775"/>
+          </a:xfrm>
+          <a:prstGeom prst="rect">
+            <a:avLst/>
+          </a:prstGeom>
+        </p:spPr>
+        <p:txBody>
+          <a:bodyPr wrap="square">
+            <a:spAutoFit/>
+          </a:bodyPr>
+          <a:lstStyle/>
+          <a:p>
+            <a:pPr lvl="0"/>
+            <a:r>
+              <a:rPr lang="en-US" sz="1600" b="1" dirty="0" err="1">
+                <a:solidFill>
+                  <a:schemeClr val="dk1"/>
+                </a:solidFill>
+                <a:latin typeface="Calibri"/>
+                <a:ea typeface="Calibri"/>
+                <a:cs typeface="Calibri"/>
+              </a:rPr>
+              <a:t>total_chairs</a:t>
+            </a:r>
             <a:r>
               <a:rPr lang="en-US" sz="1600" dirty="0">
                 <a:solidFill>
@@ -15008,32 +15896,8 @@
                 <a:ea typeface="Calibri"/>
                 <a:cs typeface="Calibri"/>
               </a:rPr>
-              <a:t>Increase </a:t>
-            </a:r>
-            <a:r>
-              <a:rPr lang="en-US" sz="1600" dirty="0">
-                <a:solidFill>
-                  <a:schemeClr val="dk1"/>
-                </a:solidFill>
-                <a:latin typeface="Calibri"/>
-                <a:ea typeface="Calibri"/>
-                <a:cs typeface="Calibri"/>
-              </a:rPr>
-              <a:t>the vertical drop by adding a run to a point 150 feet lower down but requiring the installation of an additional chair lift to bring skiers back up, without additional snow making coverage </a:t>
-            </a:r>
-            <a:endParaRPr lang="en-US" sz="1600" dirty="0" smtClean="0">
-              <a:solidFill>
-                <a:schemeClr val="dk1"/>
-              </a:solidFill>
-              <a:latin typeface="Calibri"/>
-              <a:ea typeface="Calibri"/>
-              <a:cs typeface="Calibri"/>
-            </a:endParaRPr>
-          </a:p>
-          <a:p>
-            <a:pPr marL="342900" indent="-342900">
-              <a:buAutoNum type="arabicPeriod"/>
-            </a:pPr>
+              <a:t> feature shows s a significant effect on revenue &amp; price. </a:t>
+            </a:r>
             <a:endParaRPr lang="en-US" sz="1600" dirty="0">
               <a:solidFill>
                 <a:schemeClr val="dk1"/>
@@ -15041,114 +15905,15 @@
               <a:latin typeface="Calibri"/>
               <a:ea typeface="Calibri"/>
               <a:cs typeface="Calibri"/>
+              <a:sym typeface="Calibri"/>
             </a:endParaRPr>
-          </a:p>
-          <a:p>
-            <a:pPr marL="342900" indent="-342900">
-              <a:buAutoNum type="arabicPeriod"/>
-            </a:pPr>
-            <a:r>
-              <a:rPr lang="en-US" sz="1600" dirty="0">
-                <a:solidFill>
-                  <a:schemeClr val="dk1"/>
-                </a:solidFill>
-                <a:latin typeface="Calibri"/>
-                <a:ea typeface="Calibri"/>
-                <a:cs typeface="Calibri"/>
-              </a:rPr>
-              <a:t>Same </a:t>
-            </a:r>
-            <a:r>
-              <a:rPr lang="en-US" sz="1600" dirty="0">
-                <a:solidFill>
-                  <a:schemeClr val="dk1"/>
-                </a:solidFill>
-                <a:latin typeface="Calibri"/>
-                <a:ea typeface="Calibri"/>
-                <a:cs typeface="Calibri"/>
-              </a:rPr>
-              <a:t>as </a:t>
-            </a:r>
-            <a:r>
-              <a:rPr lang="en-US" sz="1600" dirty="0" smtClean="0">
-                <a:solidFill>
-                  <a:schemeClr val="dk1"/>
-                </a:solidFill>
-                <a:latin typeface="Calibri"/>
-                <a:ea typeface="Calibri"/>
-                <a:cs typeface="Calibri"/>
-              </a:rPr>
-              <a:t>case 2</a:t>
-            </a:r>
-            <a:r>
-              <a:rPr lang="en-US" sz="1600" dirty="0">
-                <a:solidFill>
-                  <a:schemeClr val="dk1"/>
-                </a:solidFill>
-                <a:latin typeface="Calibri"/>
-                <a:ea typeface="Calibri"/>
-                <a:cs typeface="Calibri"/>
-              </a:rPr>
-              <a:t>, but adding 2 acres of snow making </a:t>
-            </a:r>
-            <a:r>
-              <a:rPr lang="en-US" sz="1600" dirty="0" smtClean="0">
-                <a:solidFill>
-                  <a:schemeClr val="dk1"/>
-                </a:solidFill>
-                <a:latin typeface="Calibri"/>
-                <a:ea typeface="Calibri"/>
-                <a:cs typeface="Calibri"/>
-              </a:rPr>
-              <a:t>cover</a:t>
-            </a:r>
-          </a:p>
-          <a:p>
-            <a:pPr marL="342900" indent="-342900">
-              <a:buAutoNum type="arabicPeriod"/>
-            </a:pPr>
-            <a:endParaRPr lang="en-US" sz="1600" dirty="0">
-              <a:solidFill>
-                <a:schemeClr val="dk1"/>
-              </a:solidFill>
-              <a:latin typeface="Calibri"/>
-              <a:ea typeface="Calibri"/>
-              <a:cs typeface="Calibri"/>
-            </a:endParaRPr>
-          </a:p>
-          <a:p>
-            <a:pPr marL="342900" indent="-342900">
-              <a:buAutoNum type="arabicPeriod"/>
-            </a:pPr>
-            <a:r>
-              <a:rPr lang="en-US" sz="1600" dirty="0">
-                <a:solidFill>
-                  <a:schemeClr val="dk1"/>
-                </a:solidFill>
-                <a:latin typeface="Calibri"/>
-                <a:ea typeface="Calibri"/>
-                <a:cs typeface="Calibri"/>
-              </a:rPr>
-              <a:t>Increase </a:t>
-            </a:r>
-            <a:r>
-              <a:rPr lang="en-US" sz="1600" dirty="0">
-                <a:solidFill>
-                  <a:schemeClr val="dk1"/>
-                </a:solidFill>
-                <a:latin typeface="Calibri"/>
-                <a:ea typeface="Calibri"/>
-                <a:cs typeface="Calibri"/>
-              </a:rPr>
-              <a:t>the longest run by 0.2 mile to boast 3.5 miles length, requiring an additional snow making coverage of 4 acres</a:t>
-            </a:r>
           </a:p>
         </p:txBody>
       </p:sp>
     </p:spTree>
     <p:extLst>
       <p:ext uri="{BB962C8B-B14F-4D97-AF65-F5344CB8AC3E}">
-        <p14:creationId xmlns:p14="http://schemas.microsoft.com/office/powerpoint/2010/main" val="1020951880"/>
+        <p14:creationId xmlns:p14="http://schemas.microsoft.com/office/powerpoint/2010/main" val="2682183367"/>
       </p:ext>
     </p:extLst>
   </p:cSld>

</xml_diff>